<commit_message>
Update pipeline images with single classified TSV
Gloss over the creation of a FASTA NR file,
picture gets too buzy if we show that as
another intermediate file.

Edited the PPTX in PowerPoint for Mac, exported as
PDF then manually cropped in Apple's Preview, and
used https://cloudconvert.com/pdf-to-svg with the
option "Text to Path" enabled for SVG.
</commit_message>
<xml_diff>
--- a/docs/images/pipeline-meta.pptx
+++ b/docs/images/pipeline-meta.pptx
@@ -5,7 +5,7 @@
     <p:sldMasterId id="2147483648" r:id="rId1"/>
   </p:sldMasterIdLst>
   <p:sldIdLst>
-    <p:sldId id="262" r:id="rId2"/>
+    <p:sldId id="261" r:id="rId2"/>
   </p:sldIdLst>
   <p:sldSz cx="12192000" cy="6858000"/>
   <p:notesSz cx="6858000" cy="9144000"/>
@@ -104,6 +104,11 @@
       </a:defRPr>
     </a:lvl9pPr>
   </p:defaultTextStyle>
+  <p:extLst>
+    <p:ext uri="{EFAFB233-063F-42B5-8137-9DF3F51BA10A}">
+      <p15:sldGuideLst xmlns:p15="http://schemas.microsoft.com/office/powerpoint/2012/main"/>
+    </p:ext>
+  </p:extLst>
 </p:presentation>
 </file>
 
@@ -254,7 +259,7 @@
           <a:p>
             <a:fld id="{9BF4B002-F650-8A49-9257-AF48A4E75ECF}" type="datetimeFigureOut">
               <a:rPr lang="en-US" smtClean="0"/>
-              <a:t>7/1/19</a:t>
+              <a:t>7/5/21</a:t>
             </a:fld>
             <a:endParaRPr lang="en-US"/>
           </a:p>
@@ -452,7 +457,7 @@
           <a:p>
             <a:fld id="{9BF4B002-F650-8A49-9257-AF48A4E75ECF}" type="datetimeFigureOut">
               <a:rPr lang="en-US" smtClean="0"/>
-              <a:t>7/1/19</a:t>
+              <a:t>7/5/21</a:t>
             </a:fld>
             <a:endParaRPr lang="en-US"/>
           </a:p>
@@ -660,7 +665,7 @@
           <a:p>
             <a:fld id="{9BF4B002-F650-8A49-9257-AF48A4E75ECF}" type="datetimeFigureOut">
               <a:rPr lang="en-US" smtClean="0"/>
-              <a:t>7/1/19</a:t>
+              <a:t>7/5/21</a:t>
             </a:fld>
             <a:endParaRPr lang="en-US"/>
           </a:p>
@@ -858,7 +863,7 @@
           <a:p>
             <a:fld id="{9BF4B002-F650-8A49-9257-AF48A4E75ECF}" type="datetimeFigureOut">
               <a:rPr lang="en-US" smtClean="0"/>
-              <a:t>7/1/19</a:t>
+              <a:t>7/5/21</a:t>
             </a:fld>
             <a:endParaRPr lang="en-US"/>
           </a:p>
@@ -1133,7 +1138,7 @@
           <a:p>
             <a:fld id="{9BF4B002-F650-8A49-9257-AF48A4E75ECF}" type="datetimeFigureOut">
               <a:rPr lang="en-US" smtClean="0"/>
-              <a:t>7/1/19</a:t>
+              <a:t>7/5/21</a:t>
             </a:fld>
             <a:endParaRPr lang="en-US"/>
           </a:p>
@@ -1398,7 +1403,7 @@
           <a:p>
             <a:fld id="{9BF4B002-F650-8A49-9257-AF48A4E75ECF}" type="datetimeFigureOut">
               <a:rPr lang="en-US" smtClean="0"/>
-              <a:t>7/1/19</a:t>
+              <a:t>7/5/21</a:t>
             </a:fld>
             <a:endParaRPr lang="en-US"/>
           </a:p>
@@ -1810,7 +1815,7 @@
           <a:p>
             <a:fld id="{9BF4B002-F650-8A49-9257-AF48A4E75ECF}" type="datetimeFigureOut">
               <a:rPr lang="en-US" smtClean="0"/>
-              <a:t>7/1/19</a:t>
+              <a:t>7/5/21</a:t>
             </a:fld>
             <a:endParaRPr lang="en-US"/>
           </a:p>
@@ -1951,7 +1956,7 @@
           <a:p>
             <a:fld id="{9BF4B002-F650-8A49-9257-AF48A4E75ECF}" type="datetimeFigureOut">
               <a:rPr lang="en-US" smtClean="0"/>
-              <a:t>7/1/19</a:t>
+              <a:t>7/5/21</a:t>
             </a:fld>
             <a:endParaRPr lang="en-US"/>
           </a:p>
@@ -2064,7 +2069,7 @@
           <a:p>
             <a:fld id="{9BF4B002-F650-8A49-9257-AF48A4E75ECF}" type="datetimeFigureOut">
               <a:rPr lang="en-US" smtClean="0"/>
-              <a:t>7/1/19</a:t>
+              <a:t>7/5/21</a:t>
             </a:fld>
             <a:endParaRPr lang="en-US"/>
           </a:p>
@@ -2375,7 +2380,7 @@
           <a:p>
             <a:fld id="{9BF4B002-F650-8A49-9257-AF48A4E75ECF}" type="datetimeFigureOut">
               <a:rPr lang="en-US" smtClean="0"/>
-              <a:t>7/1/19</a:t>
+              <a:t>7/5/21</a:t>
             </a:fld>
             <a:endParaRPr lang="en-US"/>
           </a:p>
@@ -2663,7 +2668,7 @@
           <a:p>
             <a:fld id="{9BF4B002-F650-8A49-9257-AF48A4E75ECF}" type="datetimeFigureOut">
               <a:rPr lang="en-US" smtClean="0"/>
-              <a:t>7/1/19</a:t>
+              <a:t>7/5/21</a:t>
             </a:fld>
             <a:endParaRPr lang="en-US"/>
           </a:p>
@@ -2904,7 +2909,7 @@
           <a:p>
             <a:fld id="{9BF4B002-F650-8A49-9257-AF48A4E75ECF}" type="datetimeFigureOut">
               <a:rPr lang="en-US" smtClean="0"/>
-              <a:t>7/1/19</a:t>
+              <a:t>7/5/21</a:t>
             </a:fld>
             <a:endParaRPr lang="en-US"/>
           </a:p>
@@ -3335,8 +3340,8 @@
         </p:nvSpPr>
         <p:spPr>
           <a:xfrm>
-            <a:off x="2056014" y="155169"/>
-            <a:ext cx="5835535" cy="1288871"/>
+            <a:off x="2056015" y="155169"/>
+            <a:ext cx="5658578" cy="1288871"/>
           </a:xfrm>
           <a:prstGeom prst="roundRect">
             <a:avLst/>
@@ -3389,51 +3394,6 @@
           </a:p>
         </p:txBody>
       </p:sp>
-      <p:cxnSp>
-        <p:nvCxnSpPr>
-          <p:cNvPr id="12" name="Elbow Connector 11">
-            <a:extLst>
-              <a:ext uri="{FF2B5EF4-FFF2-40B4-BE49-F238E27FC236}">
-                <a16:creationId xmlns:a16="http://schemas.microsoft.com/office/drawing/2014/main" id="{668BA55D-1142-7D43-A50B-46656F5B8843}"/>
-              </a:ext>
-            </a:extLst>
-          </p:cNvPr>
-          <p:cNvCxnSpPr>
-            <a:cxnSpLocks/>
-            <a:stCxn id="28" idx="2"/>
-            <a:endCxn id="43" idx="0"/>
-          </p:cNvCxnSpPr>
-          <p:nvPr/>
-        </p:nvCxnSpPr>
-        <p:spPr>
-          <a:xfrm rot="5400000">
-            <a:off x="4928115" y="2108800"/>
-            <a:ext cx="2898334" cy="1204589"/>
-          </a:xfrm>
-          <a:prstGeom prst="bentConnector3">
-            <a:avLst>
-              <a:gd name="adj1" fmla="val 93022"/>
-            </a:avLst>
-          </a:prstGeom>
-          <a:ln w="31750">
-            <a:tailEnd type="triangle" w="lg" len="med"/>
-          </a:ln>
-        </p:spPr>
-        <p:style>
-          <a:lnRef idx="1">
-            <a:schemeClr val="accent1"/>
-          </a:lnRef>
-          <a:fillRef idx="0">
-            <a:schemeClr val="accent1"/>
-          </a:fillRef>
-          <a:effectRef idx="0">
-            <a:schemeClr val="accent1"/>
-          </a:effectRef>
-          <a:fontRef idx="minor">
-            <a:schemeClr val="tx1"/>
-          </a:fontRef>
-        </p:style>
-      </p:cxnSp>
       <p:sp>
         <p:nvSpPr>
           <p:cNvPr id="26" name="Rounded Rectangle 25">
@@ -3448,8 +3408,8 @@
         </p:nvSpPr>
         <p:spPr>
           <a:xfrm>
-            <a:off x="7073656" y="2102689"/>
-            <a:ext cx="2221713" cy="3051202"/>
+            <a:off x="7123354" y="2160150"/>
+            <a:ext cx="1991426" cy="2873910"/>
           </a:xfrm>
           <a:prstGeom prst="roundRect">
             <a:avLst/>
@@ -3516,8 +3476,8 @@
         </p:nvSpPr>
         <p:spPr>
           <a:xfrm>
-            <a:off x="2346324" y="2162717"/>
-            <a:ext cx="2221713" cy="2997972"/>
+            <a:off x="2346324" y="2162718"/>
+            <a:ext cx="2221713" cy="2873910"/>
           </a:xfrm>
           <a:prstGeom prst="roundRect">
             <a:avLst/>
@@ -3570,1291 +3530,1300 @@
           </a:p>
         </p:txBody>
       </p:sp>
-      <p:grpSp>
-        <p:nvGrpSpPr>
-          <p:cNvPr id="2" name="Group 1">
-            <a:extLst>
-              <a:ext uri="{FF2B5EF4-FFF2-40B4-BE49-F238E27FC236}">
-                <a16:creationId xmlns:a16="http://schemas.microsoft.com/office/drawing/2014/main" id="{DFA39490-B920-DC41-A866-C1219377EA8F}"/>
-              </a:ext>
-            </a:extLst>
-          </p:cNvPr>
-          <p:cNvGrpSpPr/>
+      <p:sp>
+        <p:nvSpPr>
+          <p:cNvPr id="4" name="Multidocument 3">
+            <a:extLst>
+              <a:ext uri="{FF2B5EF4-FFF2-40B4-BE49-F238E27FC236}">
+                <a16:creationId xmlns:a16="http://schemas.microsoft.com/office/drawing/2014/main" id="{D44D42A9-9DCD-2548-876D-EC395E3ACB15}"/>
+              </a:ext>
+            </a:extLst>
+          </p:cNvPr>
+          <p:cNvSpPr/>
           <p:nvPr/>
-        </p:nvGrpSpPr>
-        <p:grpSpPr>
+        </p:nvSpPr>
+        <p:spPr>
           <a:xfrm>
             <a:off x="2166850" y="493216"/>
-            <a:ext cx="6823157" cy="4295161"/>
-            <a:chOff x="2327562" y="132999"/>
-            <a:chExt cx="6823157" cy="4295161"/>
+            <a:ext cx="1235041" cy="900000"/>
           </a:xfrm>
-        </p:grpSpPr>
-        <p:sp>
-          <p:nvSpPr>
-            <p:cNvPr id="4" name="Multidocument 3">
-              <a:extLst>
-                <a:ext uri="{FF2B5EF4-FFF2-40B4-BE49-F238E27FC236}">
-                  <a16:creationId xmlns:a16="http://schemas.microsoft.com/office/drawing/2014/main" id="{D44D42A9-9DCD-2548-876D-EC395E3ACB15}"/>
-                </a:ext>
-              </a:extLst>
-            </p:cNvPr>
-            <p:cNvSpPr/>
-            <p:nvPr/>
-          </p:nvSpPr>
-          <p:spPr>
-            <a:xfrm>
-              <a:off x="2327562" y="132999"/>
-              <a:ext cx="1235041" cy="900000"/>
-            </a:xfrm>
-            <a:prstGeom prst="flowChartMultidocument">
-              <a:avLst/>
-            </a:prstGeom>
+          <a:prstGeom prst="flowChartMultidocument">
+            <a:avLst/>
+          </a:prstGeom>
+          <a:solidFill>
+            <a:schemeClr val="accent6">
+              <a:lumMod val="40000"/>
+              <a:lumOff val="60000"/>
+            </a:schemeClr>
+          </a:solidFill>
+          <a:ln>
             <a:solidFill>
               <a:schemeClr val="accent6">
-                <a:lumMod val="40000"/>
-                <a:lumOff val="60000"/>
+                <a:lumMod val="50000"/>
               </a:schemeClr>
             </a:solidFill>
-            <a:ln>
-              <a:solidFill>
-                <a:schemeClr val="accent6">
-                  <a:lumMod val="50000"/>
-                </a:schemeClr>
-              </a:solidFill>
-            </a:ln>
-          </p:spPr>
-          <p:style>
-            <a:lnRef idx="2">
-              <a:schemeClr val="accent1">
-                <a:shade val="50000"/>
-              </a:schemeClr>
-            </a:lnRef>
-            <a:fillRef idx="1">
-              <a:schemeClr val="accent1"/>
-            </a:fillRef>
-            <a:effectRef idx="0">
-              <a:schemeClr val="accent1"/>
-            </a:effectRef>
-            <a:fontRef idx="minor">
-              <a:schemeClr val="lt1"/>
-            </a:fontRef>
-          </p:style>
-          <p:txBody>
-            <a:bodyPr rtlCol="0" anchor="t" anchorCtr="0"/>
-            <a:lstStyle/>
-            <a:p>
-              <a:pPr algn="ctr"/>
-              <a:r>
-                <a:rPr lang="en-US" dirty="0">
-                  <a:solidFill>
-                    <a:schemeClr val="tx1">
-                      <a:lumMod val="95000"/>
-                      <a:lumOff val="5000"/>
-                    </a:schemeClr>
-                  </a:solidFill>
-                </a:rPr>
-                <a:t>FASTQ</a:t>
-              </a:r>
-            </a:p>
-            <a:p>
-              <a:pPr algn="ctr"/>
-              <a:r>
-                <a:rPr lang="en-US" dirty="0">
-                  <a:solidFill>
-                    <a:schemeClr val="tx1">
-                      <a:lumMod val="95000"/>
-                      <a:lumOff val="5000"/>
-                    </a:schemeClr>
-                  </a:solidFill>
-                </a:rPr>
-                <a:t>(forward)</a:t>
-              </a:r>
-            </a:p>
-          </p:txBody>
-        </p:sp>
-        <p:sp>
-          <p:nvSpPr>
-            <p:cNvPr id="5" name="Multidocument 4">
-              <a:extLst>
-                <a:ext uri="{FF2B5EF4-FFF2-40B4-BE49-F238E27FC236}">
-                  <a16:creationId xmlns:a16="http://schemas.microsoft.com/office/drawing/2014/main" id="{BFF8A46D-DDAF-6549-BA86-F237FEC18D2F}"/>
-                </a:ext>
-              </a:extLst>
-            </p:cNvPr>
-            <p:cNvSpPr/>
-            <p:nvPr/>
-          </p:nvSpPr>
-          <p:spPr>
-            <a:xfrm>
-              <a:off x="3817683" y="132999"/>
-              <a:ext cx="1234800" cy="900000"/>
-            </a:xfrm>
-            <a:prstGeom prst="flowChartMultidocument">
-              <a:avLst/>
-            </a:prstGeom>
+          </a:ln>
+        </p:spPr>
+        <p:style>
+          <a:lnRef idx="2">
+            <a:schemeClr val="accent1">
+              <a:shade val="50000"/>
+            </a:schemeClr>
+          </a:lnRef>
+          <a:fillRef idx="1">
+            <a:schemeClr val="accent1"/>
+          </a:fillRef>
+          <a:effectRef idx="0">
+            <a:schemeClr val="accent1"/>
+          </a:effectRef>
+          <a:fontRef idx="minor">
+            <a:schemeClr val="lt1"/>
+          </a:fontRef>
+        </p:style>
+        <p:txBody>
+          <a:bodyPr rtlCol="0" anchor="t" anchorCtr="0"/>
+          <a:lstStyle/>
+          <a:p>
+            <a:pPr algn="ctr"/>
+            <a:r>
+              <a:rPr lang="en-US" dirty="0">
+                <a:solidFill>
+                  <a:schemeClr val="tx1">
+                    <a:lumMod val="95000"/>
+                    <a:lumOff val="5000"/>
+                  </a:schemeClr>
+                </a:solidFill>
+              </a:rPr>
+              <a:t>FASTQ</a:t>
+            </a:r>
+          </a:p>
+          <a:p>
+            <a:pPr algn="ctr"/>
+            <a:r>
+              <a:rPr lang="en-US" dirty="0">
+                <a:solidFill>
+                  <a:schemeClr val="tx1">
+                    <a:lumMod val="95000"/>
+                    <a:lumOff val="5000"/>
+                  </a:schemeClr>
+                </a:solidFill>
+              </a:rPr>
+              <a:t>(forward)</a:t>
+            </a:r>
+          </a:p>
+        </p:txBody>
+      </p:sp>
+      <p:sp>
+        <p:nvSpPr>
+          <p:cNvPr id="5" name="Multidocument 4">
+            <a:extLst>
+              <a:ext uri="{FF2B5EF4-FFF2-40B4-BE49-F238E27FC236}">
+                <a16:creationId xmlns:a16="http://schemas.microsoft.com/office/drawing/2014/main" id="{BFF8A46D-DDAF-6549-BA86-F237FEC18D2F}"/>
+              </a:ext>
+            </a:extLst>
+          </p:cNvPr>
+          <p:cNvSpPr/>
+          <p:nvPr/>
+        </p:nvSpPr>
+        <p:spPr>
+          <a:xfrm>
+            <a:off x="3656971" y="493216"/>
+            <a:ext cx="1234800" cy="900000"/>
+          </a:xfrm>
+          <a:prstGeom prst="flowChartMultidocument">
+            <a:avLst/>
+          </a:prstGeom>
+          <a:solidFill>
+            <a:schemeClr val="accent6">
+              <a:lumMod val="40000"/>
+              <a:lumOff val="60000"/>
+            </a:schemeClr>
+          </a:solidFill>
+          <a:ln>
             <a:solidFill>
               <a:schemeClr val="accent6">
-                <a:lumMod val="40000"/>
-                <a:lumOff val="60000"/>
+                <a:lumMod val="50000"/>
               </a:schemeClr>
             </a:solidFill>
-            <a:ln>
-              <a:solidFill>
-                <a:schemeClr val="accent6">
-                  <a:lumMod val="50000"/>
-                </a:schemeClr>
-              </a:solidFill>
-            </a:ln>
-          </p:spPr>
-          <p:style>
-            <a:lnRef idx="2">
-              <a:schemeClr val="accent1">
-                <a:shade val="50000"/>
-              </a:schemeClr>
-            </a:lnRef>
-            <a:fillRef idx="1">
-              <a:schemeClr val="accent1"/>
-            </a:fillRef>
-            <a:effectRef idx="0">
-              <a:schemeClr val="accent1"/>
-            </a:effectRef>
-            <a:fontRef idx="minor">
-              <a:schemeClr val="lt1"/>
-            </a:fontRef>
-          </p:style>
-          <p:txBody>
-            <a:bodyPr rtlCol="0" anchor="t" anchorCtr="0"/>
-            <a:lstStyle/>
-            <a:p>
-              <a:pPr algn="ctr"/>
-              <a:r>
-                <a:rPr lang="en-US" dirty="0">
-                  <a:solidFill>
-                    <a:schemeClr val="tx1">
-                      <a:lumMod val="95000"/>
-                      <a:lumOff val="5000"/>
-                    </a:schemeClr>
-                  </a:solidFill>
-                </a:rPr>
-                <a:t>FASTQ</a:t>
-              </a:r>
-            </a:p>
-            <a:p>
-              <a:pPr algn="ctr"/>
-              <a:r>
-                <a:rPr lang="en-US" dirty="0">
-                  <a:solidFill>
-                    <a:schemeClr val="tx1">
-                      <a:lumMod val="95000"/>
-                      <a:lumOff val="5000"/>
-                    </a:schemeClr>
-                  </a:solidFill>
-                </a:rPr>
-                <a:t>(reverse)</a:t>
-              </a:r>
-            </a:p>
-          </p:txBody>
-        </p:sp>
-        <p:sp>
-          <p:nvSpPr>
-            <p:cNvPr id="6" name="Predefined Process 5">
-              <a:extLst>
-                <a:ext uri="{FF2B5EF4-FFF2-40B4-BE49-F238E27FC236}">
-                  <a16:creationId xmlns:a16="http://schemas.microsoft.com/office/drawing/2014/main" id="{F9755461-691B-694C-BEE7-3EFFACE2294B}"/>
-                </a:ext>
-              </a:extLst>
-            </p:cNvPr>
-            <p:cNvSpPr/>
-            <p:nvPr/>
-          </p:nvSpPr>
-          <p:spPr>
-            <a:xfrm>
-              <a:off x="2749598" y="1385133"/>
-              <a:ext cx="1736591" cy="352215"/>
-            </a:xfrm>
-            <a:prstGeom prst="flowChartPredefinedProcess">
-              <a:avLst/>
-            </a:prstGeom>
-          </p:spPr>
-          <p:style>
-            <a:lnRef idx="2">
-              <a:schemeClr val="accent1">
-                <a:shade val="50000"/>
-              </a:schemeClr>
-            </a:lnRef>
-            <a:fillRef idx="1">
-              <a:schemeClr val="accent1"/>
-            </a:fillRef>
-            <a:effectRef idx="0">
-              <a:schemeClr val="accent1"/>
-            </a:effectRef>
-            <a:fontRef idx="minor">
-              <a:schemeClr val="lt1"/>
-            </a:fontRef>
-          </p:style>
-          <p:txBody>
-            <a:bodyPr rtlCol="0" anchor="ctr"/>
-            <a:lstStyle/>
-            <a:p>
-              <a:pPr algn="ctr"/>
-              <a:r>
-                <a:rPr lang="en-US" dirty="0">
-                  <a:latin typeface="Andale Mono" panose="020B0509000000000004" pitchFamily="49" charset="0"/>
-                </a:rPr>
-                <a:t>prepare</a:t>
-              </a:r>
-            </a:p>
-          </p:txBody>
-        </p:sp>
-        <p:cxnSp>
-          <p:nvCxnSpPr>
-            <p:cNvPr id="8" name="Elbow Connector 7">
-              <a:extLst>
-                <a:ext uri="{FF2B5EF4-FFF2-40B4-BE49-F238E27FC236}">
-                  <a16:creationId xmlns:a16="http://schemas.microsoft.com/office/drawing/2014/main" id="{E458BCC6-D8F6-2646-A2AA-BD3BC6AFB190}"/>
-                </a:ext>
-              </a:extLst>
-            </p:cNvPr>
-            <p:cNvCxnSpPr>
-              <a:cxnSpLocks/>
-              <a:stCxn id="5" idx="2"/>
-              <a:endCxn id="6" idx="0"/>
-            </p:cNvCxnSpPr>
-            <p:nvPr/>
-          </p:nvCxnSpPr>
-          <p:spPr>
-            <a:xfrm rot="5400000">
-              <a:off x="3790449" y="826362"/>
-              <a:ext cx="386217" cy="731325"/>
-            </a:xfrm>
-            <a:prstGeom prst="bentConnector3">
-              <a:avLst>
-                <a:gd name="adj1" fmla="val 50000"/>
-              </a:avLst>
-            </a:prstGeom>
-            <a:ln w="31750">
-              <a:tailEnd type="triangle" w="lg" len="med"/>
-            </a:ln>
-          </p:spPr>
-          <p:style>
-            <a:lnRef idx="1">
-              <a:schemeClr val="accent1"/>
-            </a:lnRef>
-            <a:fillRef idx="0">
-              <a:schemeClr val="accent1"/>
-            </a:fillRef>
-            <a:effectRef idx="0">
-              <a:schemeClr val="accent1"/>
-            </a:effectRef>
-            <a:fontRef idx="minor">
-              <a:schemeClr val="tx1"/>
-            </a:fontRef>
-          </p:style>
-        </p:cxnSp>
-        <p:cxnSp>
-          <p:nvCxnSpPr>
-            <p:cNvPr id="10" name="Elbow Connector 9">
-              <a:extLst>
-                <a:ext uri="{FF2B5EF4-FFF2-40B4-BE49-F238E27FC236}">
-                  <a16:creationId xmlns:a16="http://schemas.microsoft.com/office/drawing/2014/main" id="{9BE6A431-FA79-6A45-A2AE-478A4F9128B2}"/>
-                </a:ext>
-              </a:extLst>
-            </p:cNvPr>
-            <p:cNvCxnSpPr>
-              <a:cxnSpLocks/>
-              <a:stCxn id="4" idx="2"/>
-              <a:endCxn id="6" idx="0"/>
-            </p:cNvCxnSpPr>
-            <p:nvPr/>
-          </p:nvCxnSpPr>
-          <p:spPr>
-            <a:xfrm rot="16200000" flipH="1">
-              <a:off x="3045439" y="812677"/>
-              <a:ext cx="386217" cy="758693"/>
-            </a:xfrm>
-            <a:prstGeom prst="bentConnector3">
-              <a:avLst>
-                <a:gd name="adj1" fmla="val 50000"/>
-              </a:avLst>
-            </a:prstGeom>
-            <a:ln w="31750">
-              <a:tailEnd type="triangle" w="lg" len="med"/>
-            </a:ln>
-          </p:spPr>
-          <p:style>
-            <a:lnRef idx="1">
-              <a:schemeClr val="accent1"/>
-            </a:lnRef>
-            <a:fillRef idx="0">
-              <a:schemeClr val="accent1"/>
-            </a:fillRef>
-            <a:effectRef idx="0">
-              <a:schemeClr val="accent1"/>
-            </a:effectRef>
-            <a:fontRef idx="minor">
-              <a:schemeClr val="tx1"/>
-            </a:fontRef>
-          </p:style>
-        </p:cxnSp>
-        <p:cxnSp>
-          <p:nvCxnSpPr>
-            <p:cNvPr id="17" name="Straight Arrow Connector 16">
-              <a:extLst>
-                <a:ext uri="{FF2B5EF4-FFF2-40B4-BE49-F238E27FC236}">
-                  <a16:creationId xmlns:a16="http://schemas.microsoft.com/office/drawing/2014/main" id="{20CD5CD4-19B2-8C4E-A67A-BF4B50310D84}"/>
-                </a:ext>
-              </a:extLst>
-            </p:cNvPr>
-            <p:cNvCxnSpPr>
-              <a:cxnSpLocks/>
-              <a:stCxn id="6" idx="2"/>
-              <a:endCxn id="15" idx="0"/>
-            </p:cNvCxnSpPr>
-            <p:nvPr/>
-          </p:nvCxnSpPr>
-          <p:spPr>
-            <a:xfrm>
-              <a:off x="3617894" y="1737348"/>
-              <a:ext cx="0" cy="219835"/>
-            </a:xfrm>
-            <a:prstGeom prst="straightConnector1">
-              <a:avLst/>
-            </a:prstGeom>
-            <a:ln w="31750">
-              <a:tailEnd type="triangle" w="lg" len="med"/>
-            </a:ln>
-          </p:spPr>
-          <p:style>
-            <a:lnRef idx="1">
-              <a:schemeClr val="accent1"/>
-            </a:lnRef>
-            <a:fillRef idx="0">
-              <a:schemeClr val="accent1"/>
-            </a:fillRef>
-            <a:effectRef idx="0">
-              <a:schemeClr val="accent1"/>
-            </a:effectRef>
-            <a:fontRef idx="minor">
-              <a:schemeClr val="tx1"/>
-            </a:fontRef>
-          </p:style>
-        </p:cxnSp>
-        <p:sp>
-          <p:nvSpPr>
-            <p:cNvPr id="20" name="Predefined Process 19">
-              <a:extLst>
-                <a:ext uri="{FF2B5EF4-FFF2-40B4-BE49-F238E27FC236}">
-                  <a16:creationId xmlns:a16="http://schemas.microsoft.com/office/drawing/2014/main" id="{6D0D1981-42F7-1243-9B82-BD7A2E4B3DA8}"/>
-                </a:ext>
-              </a:extLst>
-            </p:cNvPr>
-            <p:cNvSpPr/>
-            <p:nvPr/>
-          </p:nvSpPr>
-          <p:spPr>
-            <a:xfrm>
-              <a:off x="2749598" y="2970010"/>
-              <a:ext cx="1736592" cy="354625"/>
-            </a:xfrm>
-            <a:prstGeom prst="flowChartPredefinedProcess">
-              <a:avLst/>
-            </a:prstGeom>
-          </p:spPr>
-          <p:style>
-            <a:lnRef idx="2">
-              <a:schemeClr val="accent1">
-                <a:shade val="50000"/>
-              </a:schemeClr>
-            </a:lnRef>
-            <a:fillRef idx="1">
-              <a:schemeClr val="accent1"/>
-            </a:fillRef>
-            <a:effectRef idx="0">
-              <a:schemeClr val="accent1"/>
-            </a:effectRef>
-            <a:fontRef idx="minor">
-              <a:schemeClr val="lt1"/>
-            </a:fontRef>
-          </p:style>
-          <p:txBody>
-            <a:bodyPr rtlCol="0" anchor="ctr"/>
-            <a:lstStyle/>
-            <a:p>
-              <a:pPr algn="ctr"/>
-              <a:r>
-                <a:rPr lang="en-US" dirty="0">
-                  <a:latin typeface="Andale Mono" panose="020B0509000000000004" pitchFamily="49" charset="0"/>
-                </a:rPr>
-                <a:t>classify</a:t>
-              </a:r>
-            </a:p>
-          </p:txBody>
-        </p:sp>
-        <p:sp>
-          <p:nvSpPr>
-            <p:cNvPr id="21" name="Multidocument 20">
-              <a:extLst>
-                <a:ext uri="{FF2B5EF4-FFF2-40B4-BE49-F238E27FC236}">
-                  <a16:creationId xmlns:a16="http://schemas.microsoft.com/office/drawing/2014/main" id="{80D88C06-0847-C44A-8EDE-F5EAAD4DFB85}"/>
-                </a:ext>
-              </a:extLst>
-            </p:cNvPr>
-            <p:cNvSpPr/>
-            <p:nvPr/>
-          </p:nvSpPr>
-          <p:spPr>
-            <a:xfrm>
-              <a:off x="2630127" y="3528160"/>
-              <a:ext cx="1736592" cy="900000"/>
-            </a:xfrm>
-            <a:prstGeom prst="flowChartMultidocument">
-              <a:avLst/>
-            </a:prstGeom>
+          </a:ln>
+        </p:spPr>
+        <p:style>
+          <a:lnRef idx="2">
+            <a:schemeClr val="accent1">
+              <a:shade val="50000"/>
+            </a:schemeClr>
+          </a:lnRef>
+          <a:fillRef idx="1">
+            <a:schemeClr val="accent1"/>
+          </a:fillRef>
+          <a:effectRef idx="0">
+            <a:schemeClr val="accent1"/>
+          </a:effectRef>
+          <a:fontRef idx="minor">
+            <a:schemeClr val="lt1"/>
+          </a:fontRef>
+        </p:style>
+        <p:txBody>
+          <a:bodyPr rtlCol="0" anchor="t" anchorCtr="0"/>
+          <a:lstStyle/>
+          <a:p>
+            <a:pPr algn="ctr"/>
+            <a:r>
+              <a:rPr lang="en-US" dirty="0">
+                <a:solidFill>
+                  <a:schemeClr val="tx1">
+                    <a:lumMod val="95000"/>
+                    <a:lumOff val="5000"/>
+                  </a:schemeClr>
+                </a:solidFill>
+              </a:rPr>
+              <a:t>FASTQ</a:t>
+            </a:r>
+          </a:p>
+          <a:p>
+            <a:pPr algn="ctr"/>
+            <a:r>
+              <a:rPr lang="en-US" dirty="0">
+                <a:solidFill>
+                  <a:schemeClr val="tx1">
+                    <a:lumMod val="95000"/>
+                    <a:lumOff val="5000"/>
+                  </a:schemeClr>
+                </a:solidFill>
+              </a:rPr>
+              <a:t>(reverse)</a:t>
+            </a:r>
+          </a:p>
+        </p:txBody>
+      </p:sp>
+      <p:sp>
+        <p:nvSpPr>
+          <p:cNvPr id="6" name="Predefined Process 5">
+            <a:extLst>
+              <a:ext uri="{FF2B5EF4-FFF2-40B4-BE49-F238E27FC236}">
+                <a16:creationId xmlns:a16="http://schemas.microsoft.com/office/drawing/2014/main" id="{F9755461-691B-694C-BEE7-3EFFACE2294B}"/>
+              </a:ext>
+            </a:extLst>
+          </p:cNvPr>
+          <p:cNvSpPr/>
+          <p:nvPr/>
+        </p:nvSpPr>
+        <p:spPr>
+          <a:xfrm>
+            <a:off x="2588886" y="1745350"/>
+            <a:ext cx="1736591" cy="352215"/>
+          </a:xfrm>
+          <a:prstGeom prst="flowChartPredefinedProcess">
+            <a:avLst/>
+          </a:prstGeom>
+        </p:spPr>
+        <p:style>
+          <a:lnRef idx="2">
+            <a:schemeClr val="accent1">
+              <a:shade val="50000"/>
+            </a:schemeClr>
+          </a:lnRef>
+          <a:fillRef idx="1">
+            <a:schemeClr val="accent1"/>
+          </a:fillRef>
+          <a:effectRef idx="0">
+            <a:schemeClr val="accent1"/>
+          </a:effectRef>
+          <a:fontRef idx="minor">
+            <a:schemeClr val="lt1"/>
+          </a:fontRef>
+        </p:style>
+        <p:txBody>
+          <a:bodyPr rtlCol="0" anchor="ctr"/>
+          <a:lstStyle/>
+          <a:p>
+            <a:pPr algn="ctr"/>
+            <a:r>
+              <a:rPr lang="en-US" dirty="0">
+                <a:latin typeface="Andale Mono" panose="020B0509000000000004" pitchFamily="49" charset="0"/>
+              </a:rPr>
+              <a:t>prepare</a:t>
+            </a:r>
+          </a:p>
+        </p:txBody>
+      </p:sp>
+      <p:cxnSp>
+        <p:nvCxnSpPr>
+          <p:cNvPr id="8" name="Elbow Connector 7">
+            <a:extLst>
+              <a:ext uri="{FF2B5EF4-FFF2-40B4-BE49-F238E27FC236}">
+                <a16:creationId xmlns:a16="http://schemas.microsoft.com/office/drawing/2014/main" id="{E458BCC6-D8F6-2646-A2AA-BD3BC6AFB190}"/>
+              </a:ext>
+            </a:extLst>
+          </p:cNvPr>
+          <p:cNvCxnSpPr>
+            <a:cxnSpLocks/>
+            <a:stCxn id="5" idx="2"/>
+            <a:endCxn id="6" idx="0"/>
+          </p:cNvCxnSpPr>
+          <p:nvPr/>
+        </p:nvCxnSpPr>
+        <p:spPr>
+          <a:xfrm rot="5400000">
+            <a:off x="3629737" y="1186579"/>
+            <a:ext cx="386217" cy="731325"/>
+          </a:xfrm>
+          <a:prstGeom prst="bentConnector3">
+            <a:avLst>
+              <a:gd name="adj1" fmla="val 50000"/>
+            </a:avLst>
+          </a:prstGeom>
+          <a:ln w="31750">
+            <a:tailEnd type="triangle" w="lg" len="med"/>
+          </a:ln>
+        </p:spPr>
+        <p:style>
+          <a:lnRef idx="1">
+            <a:schemeClr val="accent1"/>
+          </a:lnRef>
+          <a:fillRef idx="0">
+            <a:schemeClr val="accent1"/>
+          </a:fillRef>
+          <a:effectRef idx="0">
+            <a:schemeClr val="accent1"/>
+          </a:effectRef>
+          <a:fontRef idx="minor">
+            <a:schemeClr val="tx1"/>
+          </a:fontRef>
+        </p:style>
+      </p:cxnSp>
+      <p:cxnSp>
+        <p:nvCxnSpPr>
+          <p:cNvPr id="10" name="Elbow Connector 9">
+            <a:extLst>
+              <a:ext uri="{FF2B5EF4-FFF2-40B4-BE49-F238E27FC236}">
+                <a16:creationId xmlns:a16="http://schemas.microsoft.com/office/drawing/2014/main" id="{9BE6A431-FA79-6A45-A2AE-478A4F9128B2}"/>
+              </a:ext>
+            </a:extLst>
+          </p:cNvPr>
+          <p:cNvCxnSpPr>
+            <a:cxnSpLocks/>
+            <a:stCxn id="4" idx="2"/>
+            <a:endCxn id="6" idx="0"/>
+          </p:cNvCxnSpPr>
+          <p:nvPr/>
+        </p:nvCxnSpPr>
+        <p:spPr>
+          <a:xfrm rot="16200000" flipH="1">
+            <a:off x="2884727" y="1172894"/>
+            <a:ext cx="386217" cy="758693"/>
+          </a:xfrm>
+          <a:prstGeom prst="bentConnector3">
+            <a:avLst>
+              <a:gd name="adj1" fmla="val 50000"/>
+            </a:avLst>
+          </a:prstGeom>
+          <a:ln w="31750">
+            <a:tailEnd type="triangle" w="lg" len="med"/>
+          </a:ln>
+        </p:spPr>
+        <p:style>
+          <a:lnRef idx="1">
+            <a:schemeClr val="accent1"/>
+          </a:lnRef>
+          <a:fillRef idx="0">
+            <a:schemeClr val="accent1"/>
+          </a:fillRef>
+          <a:effectRef idx="0">
+            <a:schemeClr val="accent1"/>
+          </a:effectRef>
+          <a:fontRef idx="minor">
+            <a:schemeClr val="tx1"/>
+          </a:fontRef>
+        </p:style>
+      </p:cxnSp>
+      <p:cxnSp>
+        <p:nvCxnSpPr>
+          <p:cNvPr id="17" name="Straight Arrow Connector 16">
+            <a:extLst>
+              <a:ext uri="{FF2B5EF4-FFF2-40B4-BE49-F238E27FC236}">
+                <a16:creationId xmlns:a16="http://schemas.microsoft.com/office/drawing/2014/main" id="{20CD5CD4-19B2-8C4E-A67A-BF4B50310D84}"/>
+              </a:ext>
+            </a:extLst>
+          </p:cNvPr>
+          <p:cNvCxnSpPr>
+            <a:cxnSpLocks/>
+            <a:stCxn id="6" idx="2"/>
+            <a:endCxn id="15" idx="0"/>
+          </p:cNvCxnSpPr>
+          <p:nvPr/>
+        </p:nvCxnSpPr>
+        <p:spPr>
+          <a:xfrm>
+            <a:off x="3457182" y="2097565"/>
+            <a:ext cx="0" cy="219835"/>
+          </a:xfrm>
+          <a:prstGeom prst="straightConnector1">
+            <a:avLst/>
+          </a:prstGeom>
+          <a:ln w="31750">
+            <a:tailEnd type="triangle" w="lg" len="med"/>
+          </a:ln>
+        </p:spPr>
+        <p:style>
+          <a:lnRef idx="1">
+            <a:schemeClr val="accent1"/>
+          </a:lnRef>
+          <a:fillRef idx="0">
+            <a:schemeClr val="accent1"/>
+          </a:fillRef>
+          <a:effectRef idx="0">
+            <a:schemeClr val="accent1"/>
+          </a:effectRef>
+          <a:fontRef idx="minor">
+            <a:schemeClr val="tx1"/>
+          </a:fontRef>
+        </p:style>
+      </p:cxnSp>
+      <p:sp>
+        <p:nvSpPr>
+          <p:cNvPr id="20" name="Predefined Process 19">
+            <a:extLst>
+              <a:ext uri="{FF2B5EF4-FFF2-40B4-BE49-F238E27FC236}">
+                <a16:creationId xmlns:a16="http://schemas.microsoft.com/office/drawing/2014/main" id="{6D0D1981-42F7-1243-9B82-BD7A2E4B3DA8}"/>
+              </a:ext>
+            </a:extLst>
+          </p:cNvPr>
+          <p:cNvSpPr/>
+          <p:nvPr/>
+        </p:nvSpPr>
+        <p:spPr>
+          <a:xfrm>
+            <a:off x="2588886" y="3351247"/>
+            <a:ext cx="1736592" cy="354625"/>
+          </a:xfrm>
+          <a:prstGeom prst="flowChartPredefinedProcess">
+            <a:avLst/>
+          </a:prstGeom>
+        </p:spPr>
+        <p:style>
+          <a:lnRef idx="2">
+            <a:schemeClr val="accent1">
+              <a:shade val="50000"/>
+            </a:schemeClr>
+          </a:lnRef>
+          <a:fillRef idx="1">
+            <a:schemeClr val="accent1"/>
+          </a:fillRef>
+          <a:effectRef idx="0">
+            <a:schemeClr val="accent1"/>
+          </a:effectRef>
+          <a:fontRef idx="minor">
+            <a:schemeClr val="lt1"/>
+          </a:fontRef>
+        </p:style>
+        <p:txBody>
+          <a:bodyPr rtlCol="0" anchor="ctr"/>
+          <a:lstStyle/>
+          <a:p>
+            <a:pPr algn="ctr"/>
+            <a:r>
+              <a:rPr lang="en-US" dirty="0">
+                <a:latin typeface="Andale Mono" panose="020B0509000000000004" pitchFamily="49" charset="0"/>
+              </a:rPr>
+              <a:t>classify</a:t>
+            </a:r>
+          </a:p>
+        </p:txBody>
+      </p:sp>
+      <p:cxnSp>
+        <p:nvCxnSpPr>
+          <p:cNvPr id="22" name="Straight Arrow Connector 21">
+            <a:extLst>
+              <a:ext uri="{FF2B5EF4-FFF2-40B4-BE49-F238E27FC236}">
+                <a16:creationId xmlns:a16="http://schemas.microsoft.com/office/drawing/2014/main" id="{A09C523A-EE6B-D048-9DD5-64BEE1B1EF37}"/>
+              </a:ext>
+            </a:extLst>
+          </p:cNvPr>
+          <p:cNvCxnSpPr>
+            <a:cxnSpLocks/>
+            <a:stCxn id="15" idx="0"/>
+            <a:endCxn id="20" idx="0"/>
+          </p:cNvCxnSpPr>
+          <p:nvPr/>
+        </p:nvCxnSpPr>
+        <p:spPr>
+          <a:xfrm>
+            <a:off x="3457182" y="2317400"/>
+            <a:ext cx="0" cy="1033847"/>
+          </a:xfrm>
+          <a:prstGeom prst="straightConnector1">
+            <a:avLst/>
+          </a:prstGeom>
+          <a:ln w="31750">
+            <a:tailEnd type="triangle" w="lg" len="med"/>
+          </a:ln>
+        </p:spPr>
+        <p:style>
+          <a:lnRef idx="1">
+            <a:schemeClr val="accent1"/>
+          </a:lnRef>
+          <a:fillRef idx="0">
+            <a:schemeClr val="accent1"/>
+          </a:fillRef>
+          <a:effectRef idx="0">
+            <a:schemeClr val="accent1"/>
+          </a:effectRef>
+          <a:fontRef idx="minor">
+            <a:schemeClr val="tx1"/>
+          </a:fontRef>
+        </p:style>
+      </p:cxnSp>
+      <p:cxnSp>
+        <p:nvCxnSpPr>
+          <p:cNvPr id="25" name="Straight Arrow Connector 24">
+            <a:extLst>
+              <a:ext uri="{FF2B5EF4-FFF2-40B4-BE49-F238E27FC236}">
+                <a16:creationId xmlns:a16="http://schemas.microsoft.com/office/drawing/2014/main" id="{E9A71320-AD7C-E141-9B63-C5F4C26CFCD2}"/>
+              </a:ext>
+            </a:extLst>
+          </p:cNvPr>
+          <p:cNvCxnSpPr>
+            <a:cxnSpLocks/>
+            <a:stCxn id="20" idx="2"/>
+          </p:cNvCxnSpPr>
+          <p:nvPr/>
+        </p:nvCxnSpPr>
+        <p:spPr>
+          <a:xfrm>
+            <a:off x="3457182" y="3705872"/>
+            <a:ext cx="0" cy="333949"/>
+          </a:xfrm>
+          <a:prstGeom prst="straightConnector1">
+            <a:avLst/>
+          </a:prstGeom>
+          <a:ln w="31750">
+            <a:tailEnd type="triangle" w="lg" len="med"/>
+          </a:ln>
+        </p:spPr>
+        <p:style>
+          <a:lnRef idx="1">
+            <a:schemeClr val="accent1"/>
+          </a:lnRef>
+          <a:fillRef idx="0">
+            <a:schemeClr val="accent1"/>
+          </a:fillRef>
+          <a:effectRef idx="0">
+            <a:schemeClr val="accent1"/>
+          </a:effectRef>
+          <a:fontRef idx="minor">
+            <a:schemeClr val="tx1"/>
+          </a:fontRef>
+        </p:style>
+      </p:cxnSp>
+      <p:sp>
+        <p:nvSpPr>
+          <p:cNvPr id="39" name="Direct Access Storage 38">
+            <a:extLst>
+              <a:ext uri="{FF2B5EF4-FFF2-40B4-BE49-F238E27FC236}">
+                <a16:creationId xmlns:a16="http://schemas.microsoft.com/office/drawing/2014/main" id="{1E343600-653D-E140-9248-C69F229F6E8C}"/>
+              </a:ext>
+            </a:extLst>
+          </p:cNvPr>
+          <p:cNvSpPr/>
+          <p:nvPr/>
+        </p:nvSpPr>
+        <p:spPr>
+          <a:xfrm>
+            <a:off x="4710958" y="3205947"/>
+            <a:ext cx="2128058" cy="652838"/>
+          </a:xfrm>
+          <a:prstGeom prst="flowChartMagneticDrum">
+            <a:avLst/>
+          </a:prstGeom>
+          <a:solidFill>
+            <a:schemeClr val="accent1">
+              <a:lumMod val="40000"/>
+              <a:lumOff val="60000"/>
+            </a:schemeClr>
+          </a:solidFill>
+          <a:ln>
             <a:solidFill>
-              <a:schemeClr val="accent4">
-                <a:lumMod val="40000"/>
-                <a:lumOff val="60000"/>
+              <a:schemeClr val="tx1">
+                <a:lumMod val="95000"/>
+                <a:lumOff val="5000"/>
               </a:schemeClr>
             </a:solidFill>
-            <a:ln>
+          </a:ln>
+        </p:spPr>
+        <p:style>
+          <a:lnRef idx="2">
+            <a:schemeClr val="accent1">
+              <a:shade val="50000"/>
+            </a:schemeClr>
+          </a:lnRef>
+          <a:fillRef idx="1">
+            <a:schemeClr val="accent1"/>
+          </a:fillRef>
+          <a:effectRef idx="0">
+            <a:schemeClr val="accent1"/>
+          </a:effectRef>
+          <a:fontRef idx="minor">
+            <a:schemeClr val="lt1"/>
+          </a:fontRef>
+        </p:style>
+        <p:txBody>
+          <a:bodyPr rtlCol="0" anchor="ctr"/>
+          <a:lstStyle/>
+          <a:p>
+            <a:pPr algn="ctr"/>
+            <a:r>
+              <a:rPr lang="en-US" dirty="0">
+                <a:solidFill>
+                  <a:schemeClr val="tx1">
+                    <a:lumMod val="95000"/>
+                    <a:lumOff val="5000"/>
+                  </a:schemeClr>
+                </a:solidFill>
+              </a:rPr>
+              <a:t>ITS1 Database</a:t>
+            </a:r>
+          </a:p>
+        </p:txBody>
+      </p:sp>
+      <p:cxnSp>
+        <p:nvCxnSpPr>
+          <p:cNvPr id="40" name="Straight Arrow Connector 39">
+            <a:extLst>
+              <a:ext uri="{FF2B5EF4-FFF2-40B4-BE49-F238E27FC236}">
+                <a16:creationId xmlns:a16="http://schemas.microsoft.com/office/drawing/2014/main" id="{C1C55D77-C6F0-6348-AD64-F1270D96C8A8}"/>
+              </a:ext>
+            </a:extLst>
+          </p:cNvPr>
+          <p:cNvCxnSpPr>
+            <a:cxnSpLocks/>
+            <a:stCxn id="39" idx="1"/>
+            <a:endCxn id="20" idx="3"/>
+          </p:cNvCxnSpPr>
+          <p:nvPr/>
+        </p:nvCxnSpPr>
+        <p:spPr>
+          <a:xfrm flipH="1" flipV="1">
+            <a:off x="4325478" y="3528560"/>
+            <a:ext cx="385480" cy="3806"/>
+          </a:xfrm>
+          <a:prstGeom prst="straightConnector1">
+            <a:avLst/>
+          </a:prstGeom>
+          <a:ln w="31750">
+            <a:tailEnd type="triangle" w="lg" len="med"/>
+          </a:ln>
+        </p:spPr>
+        <p:style>
+          <a:lnRef idx="1">
+            <a:schemeClr val="accent1"/>
+          </a:lnRef>
+          <a:fillRef idx="0">
+            <a:schemeClr val="accent1"/>
+          </a:fillRef>
+          <a:effectRef idx="0">
+            <a:schemeClr val="accent1"/>
+          </a:effectRef>
+          <a:fontRef idx="minor">
+            <a:schemeClr val="tx1"/>
+          </a:fontRef>
+        </p:style>
+      </p:cxnSp>
+      <p:sp>
+        <p:nvSpPr>
+          <p:cNvPr id="15" name="Multidocument 14">
+            <a:extLst>
+              <a:ext uri="{FF2B5EF4-FFF2-40B4-BE49-F238E27FC236}">
+                <a16:creationId xmlns:a16="http://schemas.microsoft.com/office/drawing/2014/main" id="{805A0180-590E-BC4E-92B1-B71F63777EC0}"/>
+              </a:ext>
+            </a:extLst>
+          </p:cNvPr>
+          <p:cNvSpPr/>
+          <p:nvPr/>
+        </p:nvSpPr>
+        <p:spPr>
+          <a:xfrm>
+            <a:off x="2469415" y="2317400"/>
+            <a:ext cx="1736592" cy="900000"/>
+          </a:xfrm>
+          <a:prstGeom prst="flowChartMultidocument">
+            <a:avLst/>
+          </a:prstGeom>
+          <a:solidFill>
+            <a:schemeClr val="accent4">
+              <a:lumMod val="40000"/>
+              <a:lumOff val="60000"/>
+            </a:schemeClr>
+          </a:solidFill>
+          <a:ln>
+            <a:solidFill>
+              <a:schemeClr val="tx1">
+                <a:lumMod val="95000"/>
+                <a:lumOff val="5000"/>
+              </a:schemeClr>
+            </a:solidFill>
+          </a:ln>
+        </p:spPr>
+        <p:style>
+          <a:lnRef idx="2">
+            <a:schemeClr val="accent1">
+              <a:shade val="50000"/>
+            </a:schemeClr>
+          </a:lnRef>
+          <a:fillRef idx="1">
+            <a:schemeClr val="accent1"/>
+          </a:fillRef>
+          <a:effectRef idx="0">
+            <a:schemeClr val="accent1"/>
+          </a:effectRef>
+          <a:fontRef idx="minor">
+            <a:schemeClr val="lt1"/>
+          </a:fontRef>
+        </p:style>
+        <p:txBody>
+          <a:bodyPr rtlCol="0" anchor="t" anchorCtr="0"/>
+          <a:lstStyle/>
+          <a:p>
+            <a:pPr algn="ctr"/>
+            <a:r>
+              <a:rPr lang="en-US" dirty="0">
+                <a:solidFill>
+                  <a:schemeClr val="tx1">
+                    <a:lumMod val="95000"/>
+                    <a:lumOff val="5000"/>
+                  </a:schemeClr>
+                </a:solidFill>
+              </a:rPr>
+              <a:t>FASTA</a:t>
+            </a:r>
+          </a:p>
+          <a:p>
+            <a:pPr algn="ctr"/>
+            <a:r>
+              <a:rPr lang="en-US" dirty="0">
+                <a:solidFill>
+                  <a:schemeClr val="tx1">
+                    <a:lumMod val="95000"/>
+                    <a:lumOff val="5000"/>
+                  </a:schemeClr>
+                </a:solidFill>
+              </a:rPr>
+              <a:t>(per sample)</a:t>
+            </a:r>
+          </a:p>
+        </p:txBody>
+      </p:sp>
+      <p:sp>
+        <p:nvSpPr>
+          <p:cNvPr id="43" name="Predefined Process 42">
+            <a:extLst>
+              <a:ext uri="{FF2B5EF4-FFF2-40B4-BE49-F238E27FC236}">
+                <a16:creationId xmlns:a16="http://schemas.microsoft.com/office/drawing/2014/main" id="{6099AFEC-ED7E-F149-8E5B-D69D838E0DE5}"/>
+              </a:ext>
+            </a:extLst>
+          </p:cNvPr>
+          <p:cNvSpPr/>
+          <p:nvPr/>
+        </p:nvSpPr>
+        <p:spPr>
+          <a:xfrm>
+            <a:off x="4710958" y="4086691"/>
+            <a:ext cx="2128058" cy="356232"/>
+          </a:xfrm>
+          <a:prstGeom prst="flowChartPredefinedProcess">
+            <a:avLst/>
+          </a:prstGeom>
+        </p:spPr>
+        <p:style>
+          <a:lnRef idx="2">
+            <a:schemeClr val="accent1">
+              <a:shade val="50000"/>
+            </a:schemeClr>
+          </a:lnRef>
+          <a:fillRef idx="1">
+            <a:schemeClr val="accent1"/>
+          </a:fillRef>
+          <a:effectRef idx="0">
+            <a:schemeClr val="accent1"/>
+          </a:effectRef>
+          <a:fontRef idx="minor">
+            <a:schemeClr val="lt1"/>
+          </a:fontRef>
+        </p:style>
+        <p:txBody>
+          <a:bodyPr rtlCol="0" anchor="ctr"/>
+          <a:lstStyle/>
+          <a:p>
+            <a:pPr algn="ctr"/>
+            <a:r>
+              <a:rPr lang="en-US" dirty="0">
+                <a:latin typeface="Andale Mono" panose="020B0509000000000004" pitchFamily="49" charset="0"/>
+              </a:rPr>
+              <a:t>summary</a:t>
+            </a:r>
+          </a:p>
+        </p:txBody>
+      </p:sp>
+      <p:cxnSp>
+        <p:nvCxnSpPr>
+          <p:cNvPr id="44" name="Straight Arrow Connector 43">
+            <a:extLst>
+              <a:ext uri="{FF2B5EF4-FFF2-40B4-BE49-F238E27FC236}">
+                <a16:creationId xmlns:a16="http://schemas.microsoft.com/office/drawing/2014/main" id="{36C4303B-5844-C84D-8E8F-F867F542A252}"/>
+              </a:ext>
+            </a:extLst>
+          </p:cNvPr>
+          <p:cNvCxnSpPr>
+            <a:cxnSpLocks/>
+            <a:stCxn id="28" idx="3"/>
+            <a:endCxn id="43" idx="1"/>
+          </p:cNvCxnSpPr>
+          <p:nvPr/>
+        </p:nvCxnSpPr>
+        <p:spPr>
+          <a:xfrm flipV="1">
+            <a:off x="4163961" y="4264807"/>
+            <a:ext cx="546997" cy="3700"/>
+          </a:xfrm>
+          <a:prstGeom prst="straightConnector1">
+            <a:avLst/>
+          </a:prstGeom>
+          <a:ln w="31750">
+            <a:tailEnd type="triangle" w="lg" len="med"/>
+          </a:ln>
+        </p:spPr>
+        <p:style>
+          <a:lnRef idx="1">
+            <a:schemeClr val="accent1"/>
+          </a:lnRef>
+          <a:fillRef idx="0">
+            <a:schemeClr val="accent1"/>
+          </a:fillRef>
+          <a:effectRef idx="0">
+            <a:schemeClr val="accent1"/>
+          </a:effectRef>
+          <a:fontRef idx="minor">
+            <a:schemeClr val="tx1"/>
+          </a:fontRef>
+        </p:style>
+      </p:cxnSp>
+      <p:sp>
+        <p:nvSpPr>
+          <p:cNvPr id="62" name="Predefined Process 61">
+            <a:extLst>
+              <a:ext uri="{FF2B5EF4-FFF2-40B4-BE49-F238E27FC236}">
+                <a16:creationId xmlns:a16="http://schemas.microsoft.com/office/drawing/2014/main" id="{7013FA66-4919-A746-8849-FF5694458897}"/>
+              </a:ext>
+            </a:extLst>
+          </p:cNvPr>
+          <p:cNvSpPr/>
+          <p:nvPr/>
+        </p:nvSpPr>
+        <p:spPr>
+          <a:xfrm>
+            <a:off x="4710958" y="2591689"/>
+            <a:ext cx="2128058" cy="352215"/>
+          </a:xfrm>
+          <a:prstGeom prst="flowChartPredefinedProcess">
+            <a:avLst/>
+          </a:prstGeom>
+        </p:spPr>
+        <p:style>
+          <a:lnRef idx="2">
+            <a:schemeClr val="accent1">
+              <a:shade val="50000"/>
+            </a:schemeClr>
+          </a:lnRef>
+          <a:fillRef idx="1">
+            <a:schemeClr val="accent1"/>
+          </a:fillRef>
+          <a:effectRef idx="0">
+            <a:schemeClr val="accent1"/>
+          </a:effectRef>
+          <a:fontRef idx="minor">
+            <a:schemeClr val="lt1"/>
+          </a:fontRef>
+        </p:style>
+        <p:txBody>
+          <a:bodyPr rtlCol="0" anchor="ctr"/>
+          <a:lstStyle/>
+          <a:p>
+            <a:pPr algn="ctr"/>
+            <a:r>
+              <a:rPr lang="en-US" dirty="0">
+                <a:latin typeface="Andale Mono" panose="020B0509000000000004" pitchFamily="49" charset="0"/>
+              </a:rPr>
+              <a:t>edit-graph</a:t>
+            </a:r>
+          </a:p>
+        </p:txBody>
+      </p:sp>
+      <p:cxnSp>
+        <p:nvCxnSpPr>
+          <p:cNvPr id="63" name="Straight Arrow Connector 62">
+            <a:extLst>
+              <a:ext uri="{FF2B5EF4-FFF2-40B4-BE49-F238E27FC236}">
+                <a16:creationId xmlns:a16="http://schemas.microsoft.com/office/drawing/2014/main" id="{E096ADE7-A31A-3D4C-91CF-D2A366202D60}"/>
+              </a:ext>
+            </a:extLst>
+          </p:cNvPr>
+          <p:cNvCxnSpPr>
+            <a:cxnSpLocks/>
+            <a:stCxn id="15" idx="3"/>
+            <a:endCxn id="62" idx="1"/>
+          </p:cNvCxnSpPr>
+          <p:nvPr/>
+        </p:nvCxnSpPr>
+        <p:spPr>
+          <a:xfrm>
+            <a:off x="4206007" y="2767400"/>
+            <a:ext cx="504951" cy="397"/>
+          </a:xfrm>
+          <a:prstGeom prst="straightConnector1">
+            <a:avLst/>
+          </a:prstGeom>
+          <a:ln w="31750">
+            <a:tailEnd type="triangle" w="lg" len="med"/>
+          </a:ln>
+        </p:spPr>
+        <p:style>
+          <a:lnRef idx="1">
+            <a:schemeClr val="accent1"/>
+          </a:lnRef>
+          <a:fillRef idx="0">
+            <a:schemeClr val="accent1"/>
+          </a:fillRef>
+          <a:effectRef idx="0">
+            <a:schemeClr val="accent1"/>
+          </a:effectRef>
+          <a:fontRef idx="minor">
+            <a:schemeClr val="tx1"/>
+          </a:fontRef>
+        </p:style>
+      </p:cxnSp>
+      <p:cxnSp>
+        <p:nvCxnSpPr>
+          <p:cNvPr id="142" name="Straight Arrow Connector 141">
+            <a:extLst>
+              <a:ext uri="{FF2B5EF4-FFF2-40B4-BE49-F238E27FC236}">
+                <a16:creationId xmlns:a16="http://schemas.microsoft.com/office/drawing/2014/main" id="{78837652-7F47-2241-9483-A176E72A44F8}"/>
+              </a:ext>
+            </a:extLst>
+          </p:cNvPr>
+          <p:cNvCxnSpPr>
+            <a:cxnSpLocks/>
+            <a:stCxn id="39" idx="0"/>
+            <a:endCxn id="62" idx="2"/>
+          </p:cNvCxnSpPr>
+          <p:nvPr/>
+        </p:nvCxnSpPr>
+        <p:spPr>
+          <a:xfrm flipV="1">
+            <a:off x="5774987" y="2943904"/>
+            <a:ext cx="0" cy="262043"/>
+          </a:xfrm>
+          <a:prstGeom prst="straightConnector1">
+            <a:avLst/>
+          </a:prstGeom>
+          <a:ln w="31750">
+            <a:tailEnd type="triangle" w="lg" len="med"/>
+          </a:ln>
+        </p:spPr>
+        <p:style>
+          <a:lnRef idx="1">
+            <a:schemeClr val="accent1"/>
+          </a:lnRef>
+          <a:fillRef idx="0">
+            <a:schemeClr val="accent1"/>
+          </a:fillRef>
+          <a:effectRef idx="0">
+            <a:schemeClr val="accent1"/>
+          </a:effectRef>
+          <a:fontRef idx="minor">
+            <a:schemeClr val="tx1"/>
+          </a:fontRef>
+        </p:style>
+      </p:cxnSp>
+      <p:sp>
+        <p:nvSpPr>
+          <p:cNvPr id="145" name="Document 144">
+            <a:extLst>
+              <a:ext uri="{FF2B5EF4-FFF2-40B4-BE49-F238E27FC236}">
+                <a16:creationId xmlns:a16="http://schemas.microsoft.com/office/drawing/2014/main" id="{9ADFCDE7-9EB0-2F4E-A449-9BAE26E58B05}"/>
+              </a:ext>
+            </a:extLst>
+          </p:cNvPr>
+          <p:cNvSpPr/>
+          <p:nvPr/>
+        </p:nvSpPr>
+        <p:spPr>
+          <a:xfrm>
+            <a:off x="7292801" y="2362400"/>
+            <a:ext cx="1620000" cy="810000"/>
+          </a:xfrm>
+          <a:prstGeom prst="flowChartDocument">
+            <a:avLst/>
+          </a:prstGeom>
+          <a:solidFill>
+            <a:schemeClr val="accent2">
+              <a:lumMod val="40000"/>
+              <a:lumOff val="60000"/>
+            </a:schemeClr>
+          </a:solidFill>
+          <a:ln>
+            <a:solidFill>
+              <a:schemeClr val="tx1">
+                <a:lumMod val="95000"/>
+                <a:lumOff val="5000"/>
+              </a:schemeClr>
+            </a:solidFill>
+          </a:ln>
+        </p:spPr>
+        <p:style>
+          <a:lnRef idx="2">
+            <a:schemeClr val="accent1">
+              <a:shade val="50000"/>
+            </a:schemeClr>
+          </a:lnRef>
+          <a:fillRef idx="1">
+            <a:schemeClr val="accent1"/>
+          </a:fillRef>
+          <a:effectRef idx="0">
+            <a:schemeClr val="accent1"/>
+          </a:effectRef>
+          <a:fontRef idx="minor">
+            <a:schemeClr val="lt1"/>
+          </a:fontRef>
+        </p:style>
+        <p:txBody>
+          <a:bodyPr rtlCol="0" anchor="t" anchorCtr="0"/>
+          <a:lstStyle/>
+          <a:p>
+            <a:pPr algn="ctr"/>
+            <a:r>
+              <a:rPr lang="en-US" dirty="0">
+                <a:solidFill>
+                  <a:schemeClr val="tx1">
+                    <a:lumMod val="95000"/>
+                    <a:lumOff val="5000"/>
+                  </a:schemeClr>
+                </a:solidFill>
+              </a:rPr>
+              <a:t>XGMML graph</a:t>
+            </a:r>
+          </a:p>
+          <a:p>
+            <a:pPr algn="ctr"/>
+            <a:r>
+              <a:rPr lang="en-US" dirty="0">
+                <a:solidFill>
+                  <a:schemeClr val="tx1">
+                    <a:lumMod val="95000"/>
+                    <a:lumOff val="5000"/>
+                  </a:schemeClr>
+                </a:solidFill>
+              </a:rPr>
+              <a:t>for </a:t>
+            </a:r>
+            <a:r>
+              <a:rPr lang="en-US" dirty="0" err="1">
+                <a:solidFill>
+                  <a:schemeClr val="tx1">
+                    <a:lumMod val="95000"/>
+                    <a:lumOff val="5000"/>
+                  </a:schemeClr>
+                </a:solidFill>
+              </a:rPr>
+              <a:t>Cytoscape</a:t>
+            </a:r>
+            <a:endParaRPr lang="en-US" dirty="0">
               <a:solidFill>
                 <a:schemeClr val="tx1">
                   <a:lumMod val="95000"/>
                   <a:lumOff val="5000"/>
                 </a:schemeClr>
               </a:solidFill>
-            </a:ln>
-          </p:spPr>
-          <p:style>
-            <a:lnRef idx="2">
-              <a:schemeClr val="accent1">
-                <a:shade val="50000"/>
-              </a:schemeClr>
-            </a:lnRef>
-            <a:fillRef idx="1">
-              <a:schemeClr val="accent1"/>
-            </a:fillRef>
-            <a:effectRef idx="0">
-              <a:schemeClr val="accent1"/>
-            </a:effectRef>
-            <a:fontRef idx="minor">
-              <a:schemeClr val="lt1"/>
-            </a:fontRef>
-          </p:style>
-          <p:txBody>
-            <a:bodyPr rtlCol="0" anchor="t" anchorCtr="0"/>
-            <a:lstStyle/>
-            <a:p>
-              <a:pPr algn="ctr"/>
-              <a:r>
-                <a:rPr lang="en-US" dirty="0">
-                  <a:solidFill>
-                    <a:schemeClr val="tx1">
-                      <a:lumMod val="95000"/>
-                      <a:lumOff val="5000"/>
-                    </a:schemeClr>
-                  </a:solidFill>
-                </a:rPr>
-                <a:t>TSV</a:t>
-              </a:r>
-            </a:p>
-            <a:p>
-              <a:pPr algn="ctr"/>
-              <a:r>
-                <a:rPr lang="en-US" dirty="0">
-                  <a:solidFill>
-                    <a:schemeClr val="tx1">
-                      <a:lumMod val="95000"/>
-                      <a:lumOff val="5000"/>
-                    </a:schemeClr>
-                  </a:solidFill>
-                </a:rPr>
-                <a:t>(per sample)</a:t>
-              </a:r>
-            </a:p>
-          </p:txBody>
-        </p:sp>
-        <p:cxnSp>
-          <p:nvCxnSpPr>
-            <p:cNvPr id="22" name="Straight Arrow Connector 21">
-              <a:extLst>
-                <a:ext uri="{FF2B5EF4-FFF2-40B4-BE49-F238E27FC236}">
-                  <a16:creationId xmlns:a16="http://schemas.microsoft.com/office/drawing/2014/main" id="{A09C523A-EE6B-D048-9DD5-64BEE1B1EF37}"/>
-                </a:ext>
-              </a:extLst>
-            </p:cNvPr>
-            <p:cNvCxnSpPr>
-              <a:cxnSpLocks/>
-              <a:stCxn id="15" idx="0"/>
-              <a:endCxn id="20" idx="0"/>
-            </p:cNvCxnSpPr>
-            <p:nvPr/>
-          </p:nvCxnSpPr>
-          <p:spPr>
-            <a:xfrm>
-              <a:off x="3617894" y="1957183"/>
-              <a:ext cx="0" cy="1012827"/>
-            </a:xfrm>
-            <a:prstGeom prst="straightConnector1">
-              <a:avLst/>
-            </a:prstGeom>
-            <a:ln w="31750">
-              <a:tailEnd type="triangle" w="lg" len="med"/>
-            </a:ln>
-          </p:spPr>
-          <p:style>
-            <a:lnRef idx="1">
-              <a:schemeClr val="accent1"/>
-            </a:lnRef>
-            <a:fillRef idx="0">
-              <a:schemeClr val="accent1"/>
-            </a:fillRef>
-            <a:effectRef idx="0">
-              <a:schemeClr val="accent1"/>
-            </a:effectRef>
-            <a:fontRef idx="minor">
-              <a:schemeClr val="tx1"/>
-            </a:fontRef>
-          </p:style>
-        </p:cxnSp>
-        <p:cxnSp>
-          <p:nvCxnSpPr>
-            <p:cNvPr id="25" name="Straight Arrow Connector 24">
-              <a:extLst>
-                <a:ext uri="{FF2B5EF4-FFF2-40B4-BE49-F238E27FC236}">
-                  <a16:creationId xmlns:a16="http://schemas.microsoft.com/office/drawing/2014/main" id="{E9A71320-AD7C-E141-9B63-C5F4C26CFCD2}"/>
-                </a:ext>
-              </a:extLst>
-            </p:cNvPr>
-            <p:cNvCxnSpPr>
-              <a:cxnSpLocks/>
-              <a:stCxn id="20" idx="2"/>
-              <a:endCxn id="21" idx="0"/>
-            </p:cNvCxnSpPr>
-            <p:nvPr/>
-          </p:nvCxnSpPr>
-          <p:spPr>
-            <a:xfrm>
-              <a:off x="3617894" y="3324635"/>
-              <a:ext cx="0" cy="203525"/>
-            </a:xfrm>
-            <a:prstGeom prst="straightConnector1">
-              <a:avLst/>
-            </a:prstGeom>
-            <a:ln w="31750">
-              <a:tailEnd type="triangle" w="lg" len="med"/>
-            </a:ln>
-          </p:spPr>
-          <p:style>
-            <a:lnRef idx="1">
-              <a:schemeClr val="accent1"/>
-            </a:lnRef>
-            <a:fillRef idx="0">
-              <a:schemeClr val="accent1"/>
-            </a:fillRef>
-            <a:effectRef idx="0">
-              <a:schemeClr val="accent1"/>
-            </a:effectRef>
-            <a:fontRef idx="minor">
-              <a:schemeClr val="tx1"/>
-            </a:fontRef>
-          </p:style>
-        </p:cxnSp>
-        <p:sp>
-          <p:nvSpPr>
-            <p:cNvPr id="39" name="Direct Access Storage 38">
-              <a:extLst>
-                <a:ext uri="{FF2B5EF4-FFF2-40B4-BE49-F238E27FC236}">
-                  <a16:creationId xmlns:a16="http://schemas.microsoft.com/office/drawing/2014/main" id="{1E343600-653D-E140-9248-C69F229F6E8C}"/>
-                </a:ext>
-              </a:extLst>
-            </p:cNvPr>
-            <p:cNvSpPr/>
-            <p:nvPr/>
-          </p:nvSpPr>
-          <p:spPr>
-            <a:xfrm>
-              <a:off x="4871670" y="2824710"/>
-              <a:ext cx="2128058" cy="652838"/>
-            </a:xfrm>
-            <a:prstGeom prst="flowChartMagneticDrum">
-              <a:avLst/>
-            </a:prstGeom>
+            </a:endParaRPr>
+          </a:p>
+        </p:txBody>
+      </p:sp>
+      <p:sp>
+        <p:nvSpPr>
+          <p:cNvPr id="146" name="Document 145">
+            <a:extLst>
+              <a:ext uri="{FF2B5EF4-FFF2-40B4-BE49-F238E27FC236}">
+                <a16:creationId xmlns:a16="http://schemas.microsoft.com/office/drawing/2014/main" id="{AEC571A3-A1BE-B342-85C1-B2C0ADC6A46E}"/>
+              </a:ext>
+            </a:extLst>
+          </p:cNvPr>
+          <p:cNvSpPr/>
+          <p:nvPr/>
+        </p:nvSpPr>
+        <p:spPr>
+          <a:xfrm>
+            <a:off x="7292801" y="3859807"/>
+            <a:ext cx="1620000" cy="810000"/>
+          </a:xfrm>
+          <a:prstGeom prst="flowChartDocument">
+            <a:avLst/>
+          </a:prstGeom>
+          <a:solidFill>
+            <a:schemeClr val="accent2">
+              <a:lumMod val="40000"/>
+              <a:lumOff val="60000"/>
+            </a:schemeClr>
+          </a:solidFill>
+          <a:ln>
             <a:solidFill>
-              <a:schemeClr val="accent1">
-                <a:lumMod val="40000"/>
-                <a:lumOff val="60000"/>
+              <a:schemeClr val="tx1">
+                <a:lumMod val="95000"/>
+                <a:lumOff val="5000"/>
               </a:schemeClr>
             </a:solidFill>
-            <a:ln>
-              <a:solidFill>
-                <a:schemeClr val="tx1">
-                  <a:lumMod val="95000"/>
-                  <a:lumOff val="5000"/>
-                </a:schemeClr>
-              </a:solidFill>
-            </a:ln>
-          </p:spPr>
-          <p:style>
-            <a:lnRef idx="2">
-              <a:schemeClr val="accent1">
-                <a:shade val="50000"/>
-              </a:schemeClr>
-            </a:lnRef>
-            <a:fillRef idx="1">
-              <a:schemeClr val="accent1"/>
-            </a:fillRef>
-            <a:effectRef idx="0">
-              <a:schemeClr val="accent1"/>
-            </a:effectRef>
-            <a:fontRef idx="minor">
-              <a:schemeClr val="lt1"/>
-            </a:fontRef>
-          </p:style>
-          <p:txBody>
-            <a:bodyPr rtlCol="0" anchor="ctr"/>
-            <a:lstStyle/>
-            <a:p>
-              <a:pPr algn="ctr"/>
-              <a:r>
-                <a:rPr lang="en-US" dirty="0">
-                  <a:solidFill>
-                    <a:schemeClr val="tx1">
-                      <a:lumMod val="95000"/>
-                      <a:lumOff val="5000"/>
-                    </a:schemeClr>
-                  </a:solidFill>
-                </a:rPr>
-                <a:t>ITS1 Database</a:t>
-              </a:r>
-            </a:p>
-          </p:txBody>
-        </p:sp>
-        <p:cxnSp>
-          <p:nvCxnSpPr>
-            <p:cNvPr id="40" name="Straight Arrow Connector 39">
-              <a:extLst>
-                <a:ext uri="{FF2B5EF4-FFF2-40B4-BE49-F238E27FC236}">
-                  <a16:creationId xmlns:a16="http://schemas.microsoft.com/office/drawing/2014/main" id="{C1C55D77-C6F0-6348-AD64-F1270D96C8A8}"/>
-                </a:ext>
-              </a:extLst>
-            </p:cNvPr>
-            <p:cNvCxnSpPr>
-              <a:cxnSpLocks/>
-              <a:stCxn id="39" idx="1"/>
-              <a:endCxn id="20" idx="3"/>
-            </p:cNvCxnSpPr>
-            <p:nvPr/>
-          </p:nvCxnSpPr>
-          <p:spPr>
-            <a:xfrm flipH="1" flipV="1">
-              <a:off x="4486190" y="3147323"/>
-              <a:ext cx="385480" cy="3806"/>
-            </a:xfrm>
-            <a:prstGeom prst="straightConnector1">
-              <a:avLst/>
-            </a:prstGeom>
-            <a:ln w="31750">
-              <a:tailEnd type="triangle" w="lg" len="med"/>
-            </a:ln>
-          </p:spPr>
-          <p:style>
-            <a:lnRef idx="1">
-              <a:schemeClr val="accent1"/>
-            </a:lnRef>
-            <a:fillRef idx="0">
-              <a:schemeClr val="accent1"/>
-            </a:fillRef>
-            <a:effectRef idx="0">
-              <a:schemeClr val="accent1"/>
-            </a:effectRef>
-            <a:fontRef idx="minor">
-              <a:schemeClr val="tx1"/>
-            </a:fontRef>
-          </p:style>
-        </p:cxnSp>
-        <p:sp>
-          <p:nvSpPr>
-            <p:cNvPr id="15" name="Multidocument 14">
-              <a:extLst>
-                <a:ext uri="{FF2B5EF4-FFF2-40B4-BE49-F238E27FC236}">
-                  <a16:creationId xmlns:a16="http://schemas.microsoft.com/office/drawing/2014/main" id="{805A0180-590E-BC4E-92B1-B71F63777EC0}"/>
-                </a:ext>
-              </a:extLst>
-            </p:cNvPr>
-            <p:cNvSpPr/>
-            <p:nvPr/>
-          </p:nvSpPr>
-          <p:spPr>
-            <a:xfrm>
-              <a:off x="2630127" y="1957183"/>
-              <a:ext cx="1736592" cy="900000"/>
-            </a:xfrm>
-            <a:prstGeom prst="flowChartMultidocument">
-              <a:avLst/>
-            </a:prstGeom>
-            <a:solidFill>
-              <a:schemeClr val="accent4">
-                <a:lumMod val="40000"/>
-                <a:lumOff val="60000"/>
-              </a:schemeClr>
-            </a:solidFill>
-            <a:ln>
-              <a:solidFill>
-                <a:schemeClr val="tx1">
-                  <a:lumMod val="95000"/>
-                  <a:lumOff val="5000"/>
-                </a:schemeClr>
-              </a:solidFill>
-            </a:ln>
-          </p:spPr>
-          <p:style>
-            <a:lnRef idx="2">
-              <a:schemeClr val="accent1">
-                <a:shade val="50000"/>
-              </a:schemeClr>
-            </a:lnRef>
-            <a:fillRef idx="1">
-              <a:schemeClr val="accent1"/>
-            </a:fillRef>
-            <a:effectRef idx="0">
-              <a:schemeClr val="accent1"/>
-            </a:effectRef>
-            <a:fontRef idx="minor">
-              <a:schemeClr val="lt1"/>
-            </a:fontRef>
-          </p:style>
-          <p:txBody>
-            <a:bodyPr rtlCol="0" anchor="t" anchorCtr="0"/>
-            <a:lstStyle/>
-            <a:p>
-              <a:pPr algn="ctr"/>
-              <a:r>
-                <a:rPr lang="en-US" dirty="0">
-                  <a:solidFill>
-                    <a:schemeClr val="tx1">
-                      <a:lumMod val="95000"/>
-                      <a:lumOff val="5000"/>
-                    </a:schemeClr>
-                  </a:solidFill>
-                </a:rPr>
-                <a:t>FASTA</a:t>
-              </a:r>
-            </a:p>
-            <a:p>
-              <a:pPr algn="ctr"/>
-              <a:r>
-                <a:rPr lang="en-US" dirty="0">
-                  <a:solidFill>
-                    <a:schemeClr val="tx1">
-                      <a:lumMod val="95000"/>
-                      <a:lumOff val="5000"/>
-                    </a:schemeClr>
-                  </a:solidFill>
-                </a:rPr>
-                <a:t>(per sample)</a:t>
-              </a:r>
-            </a:p>
-          </p:txBody>
-        </p:sp>
-        <p:sp>
-          <p:nvSpPr>
-            <p:cNvPr id="43" name="Predefined Process 42">
-              <a:extLst>
-                <a:ext uri="{FF2B5EF4-FFF2-40B4-BE49-F238E27FC236}">
-                  <a16:creationId xmlns:a16="http://schemas.microsoft.com/office/drawing/2014/main" id="{6099AFEC-ED7E-F149-8E5B-D69D838E0DE5}"/>
-                </a:ext>
-              </a:extLst>
-            </p:cNvPr>
-            <p:cNvSpPr/>
-            <p:nvPr/>
-          </p:nvSpPr>
-          <p:spPr>
-            <a:xfrm>
-              <a:off x="4871670" y="3800044"/>
-              <a:ext cx="2128058" cy="356232"/>
-            </a:xfrm>
-            <a:prstGeom prst="flowChartPredefinedProcess">
-              <a:avLst/>
-            </a:prstGeom>
-          </p:spPr>
-          <p:style>
-            <a:lnRef idx="2">
-              <a:schemeClr val="accent1">
-                <a:shade val="50000"/>
-              </a:schemeClr>
-            </a:lnRef>
-            <a:fillRef idx="1">
-              <a:schemeClr val="accent1"/>
-            </a:fillRef>
-            <a:effectRef idx="0">
-              <a:schemeClr val="accent1"/>
-            </a:effectRef>
-            <a:fontRef idx="minor">
-              <a:schemeClr val="lt1"/>
-            </a:fontRef>
-          </p:style>
-          <p:txBody>
-            <a:bodyPr rtlCol="0" anchor="ctr"/>
-            <a:lstStyle/>
-            <a:p>
-              <a:pPr algn="ctr"/>
-              <a:r>
-                <a:rPr lang="en-US" dirty="0">
-                  <a:latin typeface="Andale Mono" panose="020B0509000000000004" pitchFamily="49" charset="0"/>
-                </a:rPr>
-                <a:t>summary</a:t>
-              </a:r>
-            </a:p>
-          </p:txBody>
-        </p:sp>
-        <p:cxnSp>
-          <p:nvCxnSpPr>
-            <p:cNvPr id="44" name="Straight Arrow Connector 43">
-              <a:extLst>
-                <a:ext uri="{FF2B5EF4-FFF2-40B4-BE49-F238E27FC236}">
-                  <a16:creationId xmlns:a16="http://schemas.microsoft.com/office/drawing/2014/main" id="{36C4303B-5844-C84D-8E8F-F867F542A252}"/>
-                </a:ext>
-              </a:extLst>
-            </p:cNvPr>
-            <p:cNvCxnSpPr>
-              <a:cxnSpLocks/>
-              <a:stCxn id="21" idx="3"/>
-              <a:endCxn id="43" idx="1"/>
-            </p:cNvCxnSpPr>
-            <p:nvPr/>
-          </p:nvCxnSpPr>
-          <p:spPr>
-            <a:xfrm>
-              <a:off x="4366719" y="3978160"/>
-              <a:ext cx="504951" cy="0"/>
-            </a:xfrm>
-            <a:prstGeom prst="straightConnector1">
-              <a:avLst/>
-            </a:prstGeom>
-            <a:ln w="31750">
-              <a:tailEnd type="triangle" w="lg" len="med"/>
-            </a:ln>
-          </p:spPr>
-          <p:style>
-            <a:lnRef idx="1">
-              <a:schemeClr val="accent1"/>
-            </a:lnRef>
-            <a:fillRef idx="0">
-              <a:schemeClr val="accent1"/>
-            </a:fillRef>
-            <a:effectRef idx="0">
-              <a:schemeClr val="accent1"/>
-            </a:effectRef>
-            <a:fontRef idx="minor">
-              <a:schemeClr val="tx1"/>
-            </a:fontRef>
-          </p:style>
-        </p:cxnSp>
-        <p:sp>
-          <p:nvSpPr>
-            <p:cNvPr id="62" name="Predefined Process 61">
-              <a:extLst>
-                <a:ext uri="{FF2B5EF4-FFF2-40B4-BE49-F238E27FC236}">
-                  <a16:creationId xmlns:a16="http://schemas.microsoft.com/office/drawing/2014/main" id="{7013FA66-4919-A746-8849-FF5694458897}"/>
-                </a:ext>
-              </a:extLst>
-            </p:cNvPr>
-            <p:cNvSpPr/>
-            <p:nvPr/>
-          </p:nvSpPr>
-          <p:spPr>
-            <a:xfrm>
-              <a:off x="4871670" y="2231472"/>
-              <a:ext cx="2128058" cy="352215"/>
-            </a:xfrm>
-            <a:prstGeom prst="flowChartPredefinedProcess">
-              <a:avLst/>
-            </a:prstGeom>
-          </p:spPr>
-          <p:style>
-            <a:lnRef idx="2">
-              <a:schemeClr val="accent1">
-                <a:shade val="50000"/>
-              </a:schemeClr>
-            </a:lnRef>
-            <a:fillRef idx="1">
-              <a:schemeClr val="accent1"/>
-            </a:fillRef>
-            <a:effectRef idx="0">
-              <a:schemeClr val="accent1"/>
-            </a:effectRef>
-            <a:fontRef idx="minor">
-              <a:schemeClr val="lt1"/>
-            </a:fontRef>
-          </p:style>
-          <p:txBody>
-            <a:bodyPr rtlCol="0" anchor="ctr"/>
-            <a:lstStyle/>
-            <a:p>
-              <a:pPr algn="ctr"/>
-              <a:r>
-                <a:rPr lang="en-US" dirty="0">
-                  <a:latin typeface="Andale Mono" panose="020B0509000000000004" pitchFamily="49" charset="0"/>
-                </a:rPr>
-                <a:t>edit-graph</a:t>
-              </a:r>
-            </a:p>
-          </p:txBody>
-        </p:sp>
-        <p:cxnSp>
-          <p:nvCxnSpPr>
-            <p:cNvPr id="63" name="Straight Arrow Connector 62">
-              <a:extLst>
-                <a:ext uri="{FF2B5EF4-FFF2-40B4-BE49-F238E27FC236}">
-                  <a16:creationId xmlns:a16="http://schemas.microsoft.com/office/drawing/2014/main" id="{E096ADE7-A31A-3D4C-91CF-D2A366202D60}"/>
-                </a:ext>
-              </a:extLst>
-            </p:cNvPr>
-            <p:cNvCxnSpPr>
-              <a:cxnSpLocks/>
-              <a:stCxn id="15" idx="3"/>
-              <a:endCxn id="62" idx="1"/>
-            </p:cNvCxnSpPr>
-            <p:nvPr/>
-          </p:nvCxnSpPr>
-          <p:spPr>
-            <a:xfrm>
-              <a:off x="4366719" y="2407183"/>
-              <a:ext cx="504951" cy="397"/>
-            </a:xfrm>
-            <a:prstGeom prst="straightConnector1">
-              <a:avLst/>
-            </a:prstGeom>
-            <a:ln w="31750">
-              <a:tailEnd type="triangle" w="lg" len="med"/>
-            </a:ln>
-          </p:spPr>
-          <p:style>
-            <a:lnRef idx="1">
-              <a:schemeClr val="accent1"/>
-            </a:lnRef>
-            <a:fillRef idx="0">
-              <a:schemeClr val="accent1"/>
-            </a:fillRef>
-            <a:effectRef idx="0">
-              <a:schemeClr val="accent1"/>
-            </a:effectRef>
-            <a:fontRef idx="minor">
-              <a:schemeClr val="tx1"/>
-            </a:fontRef>
-          </p:style>
-        </p:cxnSp>
-        <p:cxnSp>
-          <p:nvCxnSpPr>
-            <p:cNvPr id="142" name="Straight Arrow Connector 141">
-              <a:extLst>
-                <a:ext uri="{FF2B5EF4-FFF2-40B4-BE49-F238E27FC236}">
-                  <a16:creationId xmlns:a16="http://schemas.microsoft.com/office/drawing/2014/main" id="{78837652-7F47-2241-9483-A176E72A44F8}"/>
-                </a:ext>
-              </a:extLst>
-            </p:cNvPr>
-            <p:cNvCxnSpPr>
-              <a:cxnSpLocks/>
-              <a:stCxn id="39" idx="0"/>
-              <a:endCxn id="62" idx="2"/>
-            </p:cNvCxnSpPr>
-            <p:nvPr/>
-          </p:nvCxnSpPr>
-          <p:spPr>
-            <a:xfrm flipV="1">
-              <a:off x="5935699" y="2583687"/>
-              <a:ext cx="0" cy="241023"/>
-            </a:xfrm>
-            <a:prstGeom prst="straightConnector1">
-              <a:avLst/>
-            </a:prstGeom>
-            <a:ln w="31750">
-              <a:tailEnd type="triangle" w="lg" len="med"/>
-            </a:ln>
-          </p:spPr>
-          <p:style>
-            <a:lnRef idx="1">
-              <a:schemeClr val="accent1"/>
-            </a:lnRef>
-            <a:fillRef idx="0">
-              <a:schemeClr val="accent1"/>
-            </a:fillRef>
-            <a:effectRef idx="0">
-              <a:schemeClr val="accent1"/>
-            </a:effectRef>
-            <a:fontRef idx="minor">
-              <a:schemeClr val="tx1"/>
-            </a:fontRef>
-          </p:style>
-        </p:cxnSp>
-        <p:sp>
-          <p:nvSpPr>
-            <p:cNvPr id="145" name="Document 144">
-              <a:extLst>
-                <a:ext uri="{FF2B5EF4-FFF2-40B4-BE49-F238E27FC236}">
-                  <a16:creationId xmlns:a16="http://schemas.microsoft.com/office/drawing/2014/main" id="{9ADFCDE7-9EB0-2F4E-A449-9BAE26E58B05}"/>
-                </a:ext>
-              </a:extLst>
-            </p:cNvPr>
-            <p:cNvSpPr/>
-            <p:nvPr/>
-          </p:nvSpPr>
-          <p:spPr>
-            <a:xfrm>
-              <a:off x="7530719" y="2002183"/>
-              <a:ext cx="1620000" cy="810000"/>
-            </a:xfrm>
-            <a:prstGeom prst="flowChartDocument">
-              <a:avLst/>
-            </a:prstGeom>
-            <a:solidFill>
-              <a:schemeClr val="accent2">
-                <a:lumMod val="40000"/>
-                <a:lumOff val="60000"/>
-              </a:schemeClr>
-            </a:solidFill>
-            <a:ln>
-              <a:solidFill>
-                <a:schemeClr val="tx1">
-                  <a:lumMod val="95000"/>
-                  <a:lumOff val="5000"/>
-                </a:schemeClr>
-              </a:solidFill>
-            </a:ln>
-          </p:spPr>
-          <p:style>
-            <a:lnRef idx="2">
-              <a:schemeClr val="accent1">
-                <a:shade val="50000"/>
-              </a:schemeClr>
-            </a:lnRef>
-            <a:fillRef idx="1">
-              <a:schemeClr val="accent1"/>
-            </a:fillRef>
-            <a:effectRef idx="0">
-              <a:schemeClr val="accent1"/>
-            </a:effectRef>
-            <a:fontRef idx="minor">
-              <a:schemeClr val="lt1"/>
-            </a:fontRef>
-          </p:style>
-          <p:txBody>
-            <a:bodyPr rtlCol="0" anchor="t" anchorCtr="0"/>
-            <a:lstStyle/>
-            <a:p>
-              <a:pPr algn="ctr"/>
-              <a:r>
-                <a:rPr lang="en-US" dirty="0">
-                  <a:solidFill>
-                    <a:schemeClr val="tx1">
-                      <a:lumMod val="95000"/>
-                      <a:lumOff val="5000"/>
-                    </a:schemeClr>
-                  </a:solidFill>
-                </a:rPr>
-                <a:t>XGMML graph</a:t>
-              </a:r>
-            </a:p>
-            <a:p>
-              <a:pPr algn="ctr"/>
-              <a:r>
-                <a:rPr lang="en-US" dirty="0">
-                  <a:solidFill>
-                    <a:schemeClr val="tx1">
-                      <a:lumMod val="95000"/>
-                      <a:lumOff val="5000"/>
-                    </a:schemeClr>
-                  </a:solidFill>
-                </a:rPr>
-                <a:t>for </a:t>
-              </a:r>
-              <a:r>
-                <a:rPr lang="en-US" dirty="0" err="1">
-                  <a:solidFill>
-                    <a:schemeClr val="tx1">
-                      <a:lumMod val="95000"/>
-                      <a:lumOff val="5000"/>
-                    </a:schemeClr>
-                  </a:solidFill>
-                </a:rPr>
-                <a:t>Cytoscape</a:t>
-              </a:r>
-              <a:endParaRPr lang="en-US" dirty="0">
+          </a:ln>
+        </p:spPr>
+        <p:style>
+          <a:lnRef idx="2">
+            <a:schemeClr val="accent1">
+              <a:shade val="50000"/>
+            </a:schemeClr>
+          </a:lnRef>
+          <a:fillRef idx="1">
+            <a:schemeClr val="accent1"/>
+          </a:fillRef>
+          <a:effectRef idx="0">
+            <a:schemeClr val="accent1"/>
+          </a:effectRef>
+          <a:fontRef idx="minor">
+            <a:schemeClr val="lt1"/>
+          </a:fontRef>
+        </p:style>
+        <p:txBody>
+          <a:bodyPr rtlCol="0" anchor="t" anchorCtr="0"/>
+          <a:lstStyle/>
+          <a:p>
+            <a:pPr algn="ctr"/>
+            <a:r>
+              <a:rPr lang="en-US" dirty="0">
                 <a:solidFill>
                   <a:schemeClr val="tx1">
                     <a:lumMod val="95000"/>
                     <a:lumOff val="5000"/>
                   </a:schemeClr>
                 </a:solidFill>
-              </a:endParaRPr>
-            </a:p>
-          </p:txBody>
-        </p:sp>
-        <p:sp>
-          <p:nvSpPr>
-            <p:cNvPr id="146" name="Document 145">
-              <a:extLst>
-                <a:ext uri="{FF2B5EF4-FFF2-40B4-BE49-F238E27FC236}">
-                  <a16:creationId xmlns:a16="http://schemas.microsoft.com/office/drawing/2014/main" id="{AEC571A3-A1BE-B342-85C1-B2C0ADC6A46E}"/>
-                </a:ext>
-              </a:extLst>
-            </p:cNvPr>
-            <p:cNvSpPr/>
-            <p:nvPr/>
-          </p:nvSpPr>
-          <p:spPr>
-            <a:xfrm>
-              <a:off x="7530719" y="3573160"/>
-              <a:ext cx="1620000" cy="810000"/>
-            </a:xfrm>
-            <a:prstGeom prst="flowChartDocument">
-              <a:avLst/>
-            </a:prstGeom>
+              </a:rPr>
+              <a:t>TXT, TSV, and Excel reports</a:t>
+            </a:r>
+          </a:p>
+        </p:txBody>
+      </p:sp>
+      <p:cxnSp>
+        <p:nvCxnSpPr>
+          <p:cNvPr id="147" name="Straight Arrow Connector 146">
+            <a:extLst>
+              <a:ext uri="{FF2B5EF4-FFF2-40B4-BE49-F238E27FC236}">
+                <a16:creationId xmlns:a16="http://schemas.microsoft.com/office/drawing/2014/main" id="{414DF7DA-68BC-2A4E-B52B-0E5052F12DFB}"/>
+              </a:ext>
+            </a:extLst>
+          </p:cNvPr>
+          <p:cNvCxnSpPr>
+            <a:cxnSpLocks/>
+            <a:stCxn id="62" idx="3"/>
+            <a:endCxn id="145" idx="1"/>
+          </p:cNvCxnSpPr>
+          <p:nvPr/>
+        </p:nvCxnSpPr>
+        <p:spPr>
+          <a:xfrm flipV="1">
+            <a:off x="6839016" y="2767400"/>
+            <a:ext cx="453785" cy="397"/>
+          </a:xfrm>
+          <a:prstGeom prst="straightConnector1">
+            <a:avLst/>
+          </a:prstGeom>
+          <a:ln w="31750">
+            <a:tailEnd type="triangle" w="lg" len="med"/>
+          </a:ln>
+        </p:spPr>
+        <p:style>
+          <a:lnRef idx="1">
+            <a:schemeClr val="accent1"/>
+          </a:lnRef>
+          <a:fillRef idx="0">
+            <a:schemeClr val="accent1"/>
+          </a:fillRef>
+          <a:effectRef idx="0">
+            <a:schemeClr val="accent1"/>
+          </a:effectRef>
+          <a:fontRef idx="minor">
+            <a:schemeClr val="tx1"/>
+          </a:fontRef>
+        </p:style>
+      </p:cxnSp>
+      <p:cxnSp>
+        <p:nvCxnSpPr>
+          <p:cNvPr id="150" name="Straight Arrow Connector 149">
+            <a:extLst>
+              <a:ext uri="{FF2B5EF4-FFF2-40B4-BE49-F238E27FC236}">
+                <a16:creationId xmlns:a16="http://schemas.microsoft.com/office/drawing/2014/main" id="{A2DCFD74-FF9F-274F-850B-AF208EC79FF1}"/>
+              </a:ext>
+            </a:extLst>
+          </p:cNvPr>
+          <p:cNvCxnSpPr>
+            <a:cxnSpLocks/>
+            <a:stCxn id="43" idx="3"/>
+            <a:endCxn id="146" idx="1"/>
+          </p:cNvCxnSpPr>
+          <p:nvPr/>
+        </p:nvCxnSpPr>
+        <p:spPr>
+          <a:xfrm>
+            <a:off x="6839016" y="4264807"/>
+            <a:ext cx="453785" cy="0"/>
+          </a:xfrm>
+          <a:prstGeom prst="straightConnector1">
+            <a:avLst/>
+          </a:prstGeom>
+          <a:ln w="31750">
+            <a:tailEnd type="triangle" w="lg" len="med"/>
+          </a:ln>
+        </p:spPr>
+        <p:style>
+          <a:lnRef idx="1">
+            <a:schemeClr val="accent1"/>
+          </a:lnRef>
+          <a:fillRef idx="0">
+            <a:schemeClr val="accent1"/>
+          </a:fillRef>
+          <a:effectRef idx="0">
+            <a:schemeClr val="accent1"/>
+          </a:effectRef>
+          <a:fontRef idx="minor">
+            <a:schemeClr val="tx1"/>
+          </a:fontRef>
+        </p:style>
+      </p:cxnSp>
+      <p:sp>
+        <p:nvSpPr>
+          <p:cNvPr id="28" name="Document 27">
+            <a:extLst>
+              <a:ext uri="{FF2B5EF4-FFF2-40B4-BE49-F238E27FC236}">
+                <a16:creationId xmlns:a16="http://schemas.microsoft.com/office/drawing/2014/main" id="{5C1A5AC8-640B-334C-B351-6D6A1593FEE0}"/>
+              </a:ext>
+            </a:extLst>
+          </p:cNvPr>
+          <p:cNvSpPr/>
+          <p:nvPr/>
+        </p:nvSpPr>
+        <p:spPr>
+          <a:xfrm>
+            <a:off x="2543961" y="4039821"/>
+            <a:ext cx="1620000" cy="457371"/>
+          </a:xfrm>
+          <a:prstGeom prst="flowChartDocument">
+            <a:avLst/>
+          </a:prstGeom>
+          <a:solidFill>
+            <a:schemeClr val="accent4">
+              <a:lumMod val="40000"/>
+              <a:lumOff val="60000"/>
+            </a:schemeClr>
+          </a:solidFill>
+          <a:ln>
             <a:solidFill>
-              <a:schemeClr val="accent2">
-                <a:lumMod val="40000"/>
-                <a:lumOff val="60000"/>
+              <a:schemeClr val="tx1">
+                <a:lumMod val="95000"/>
+                <a:lumOff val="5000"/>
               </a:schemeClr>
             </a:solidFill>
-            <a:ln>
-              <a:solidFill>
-                <a:schemeClr val="tx1">
-                  <a:lumMod val="95000"/>
-                  <a:lumOff val="5000"/>
-                </a:schemeClr>
-              </a:solidFill>
-            </a:ln>
-          </p:spPr>
-          <p:style>
-            <a:lnRef idx="2">
-              <a:schemeClr val="accent1">
-                <a:shade val="50000"/>
-              </a:schemeClr>
-            </a:lnRef>
-            <a:fillRef idx="1">
-              <a:schemeClr val="accent1"/>
-            </a:fillRef>
-            <a:effectRef idx="0">
-              <a:schemeClr val="accent1"/>
-            </a:effectRef>
-            <a:fontRef idx="minor">
-              <a:schemeClr val="lt1"/>
-            </a:fontRef>
-          </p:style>
-          <p:txBody>
-            <a:bodyPr rtlCol="0" anchor="t" anchorCtr="0"/>
-            <a:lstStyle/>
-            <a:p>
-              <a:pPr algn="ctr"/>
-              <a:r>
-                <a:rPr lang="en-US" dirty="0">
-                  <a:solidFill>
-                    <a:schemeClr val="tx1">
-                      <a:lumMod val="95000"/>
-                      <a:lumOff val="5000"/>
-                    </a:schemeClr>
-                  </a:solidFill>
-                </a:rPr>
-                <a:t>TXT, TSV, and Excel reports</a:t>
-              </a:r>
-            </a:p>
-          </p:txBody>
-        </p:sp>
-        <p:cxnSp>
-          <p:nvCxnSpPr>
-            <p:cNvPr id="147" name="Straight Arrow Connector 146">
-              <a:extLst>
-                <a:ext uri="{FF2B5EF4-FFF2-40B4-BE49-F238E27FC236}">
-                  <a16:creationId xmlns:a16="http://schemas.microsoft.com/office/drawing/2014/main" id="{414DF7DA-68BC-2A4E-B52B-0E5052F12DFB}"/>
-                </a:ext>
-              </a:extLst>
-            </p:cNvPr>
-            <p:cNvCxnSpPr>
-              <a:cxnSpLocks/>
-              <a:stCxn id="62" idx="3"/>
-              <a:endCxn id="145" idx="1"/>
-            </p:cNvCxnSpPr>
-            <p:nvPr/>
-          </p:nvCxnSpPr>
-          <p:spPr>
-            <a:xfrm flipV="1">
-              <a:off x="6999728" y="2407183"/>
-              <a:ext cx="530991" cy="397"/>
-            </a:xfrm>
-            <a:prstGeom prst="straightConnector1">
-              <a:avLst/>
-            </a:prstGeom>
-            <a:ln w="31750">
-              <a:tailEnd type="triangle" w="lg" len="med"/>
-            </a:ln>
-          </p:spPr>
-          <p:style>
-            <a:lnRef idx="1">
-              <a:schemeClr val="accent1"/>
-            </a:lnRef>
-            <a:fillRef idx="0">
-              <a:schemeClr val="accent1"/>
-            </a:fillRef>
-            <a:effectRef idx="0">
-              <a:schemeClr val="accent1"/>
-            </a:effectRef>
-            <a:fontRef idx="minor">
-              <a:schemeClr val="tx1"/>
-            </a:fontRef>
-          </p:style>
-        </p:cxnSp>
-        <p:cxnSp>
-          <p:nvCxnSpPr>
-            <p:cNvPr id="150" name="Straight Arrow Connector 149">
-              <a:extLst>
-                <a:ext uri="{FF2B5EF4-FFF2-40B4-BE49-F238E27FC236}">
-                  <a16:creationId xmlns:a16="http://schemas.microsoft.com/office/drawing/2014/main" id="{A2DCFD74-FF9F-274F-850B-AF208EC79FF1}"/>
-                </a:ext>
-              </a:extLst>
-            </p:cNvPr>
-            <p:cNvCxnSpPr>
-              <a:cxnSpLocks/>
-              <a:stCxn id="43" idx="3"/>
-              <a:endCxn id="146" idx="1"/>
-            </p:cNvCxnSpPr>
-            <p:nvPr/>
-          </p:nvCxnSpPr>
-          <p:spPr>
-            <a:xfrm>
-              <a:off x="6999728" y="3978160"/>
-              <a:ext cx="530991" cy="0"/>
-            </a:xfrm>
-            <a:prstGeom prst="straightConnector1">
-              <a:avLst/>
-            </a:prstGeom>
-            <a:ln w="31750">
-              <a:tailEnd type="triangle" w="lg" len="med"/>
-            </a:ln>
-          </p:spPr>
-          <p:style>
-            <a:lnRef idx="1">
-              <a:schemeClr val="accent1"/>
-            </a:lnRef>
-            <a:fillRef idx="0">
-              <a:schemeClr val="accent1"/>
-            </a:fillRef>
-            <a:effectRef idx="0">
-              <a:schemeClr val="accent1"/>
-            </a:effectRef>
-            <a:fontRef idx="minor">
-              <a:schemeClr val="tx1"/>
-            </a:fontRef>
-          </p:style>
-        </p:cxnSp>
-      </p:grpSp>
-      <p:sp>
-        <p:nvSpPr>
-          <p:cNvPr id="28" name="Document 27">
-            <a:extLst>
-              <a:ext uri="{FF2B5EF4-FFF2-40B4-BE49-F238E27FC236}">
-                <a16:creationId xmlns:a16="http://schemas.microsoft.com/office/drawing/2014/main" id="{A9662551-88AE-FE44-9282-2034988D478D}"/>
+          </a:ln>
+        </p:spPr>
+        <p:style>
+          <a:lnRef idx="2">
+            <a:schemeClr val="accent1">
+              <a:shade val="50000"/>
+            </a:schemeClr>
+          </a:lnRef>
+          <a:fillRef idx="1">
+            <a:schemeClr val="accent1"/>
+          </a:fillRef>
+          <a:effectRef idx="0">
+            <a:schemeClr val="accent1"/>
+          </a:effectRef>
+          <a:fontRef idx="minor">
+            <a:schemeClr val="lt1"/>
+          </a:fontRef>
+        </p:style>
+        <p:txBody>
+          <a:bodyPr rtlCol="0" anchor="t" anchorCtr="0"/>
+          <a:lstStyle/>
+          <a:p>
+            <a:pPr algn="ctr"/>
+            <a:r>
+              <a:rPr lang="en-US" dirty="0">
+                <a:solidFill>
+                  <a:schemeClr val="tx1">
+                    <a:lumMod val="95000"/>
+                    <a:lumOff val="5000"/>
+                  </a:schemeClr>
+                </a:solidFill>
+              </a:rPr>
+              <a:t>Pooled TSV</a:t>
+            </a:r>
+          </a:p>
+        </p:txBody>
+      </p:sp>
+      <p:cxnSp>
+        <p:nvCxnSpPr>
+          <p:cNvPr id="34" name="Elbow Connector 33">
+            <a:extLst>
+              <a:ext uri="{FF2B5EF4-FFF2-40B4-BE49-F238E27FC236}">
+                <a16:creationId xmlns:a16="http://schemas.microsoft.com/office/drawing/2014/main" id="{C4272220-EF2B-474F-83E5-6B07A806373F}"/>
+              </a:ext>
+            </a:extLst>
+          </p:cNvPr>
+          <p:cNvCxnSpPr>
+            <a:cxnSpLocks/>
+            <a:stCxn id="35" idx="2"/>
+            <a:endCxn id="43" idx="0"/>
+          </p:cNvCxnSpPr>
+          <p:nvPr/>
+        </p:nvCxnSpPr>
+        <p:spPr>
+          <a:xfrm rot="5400000">
+            <a:off x="4964900" y="2072015"/>
+            <a:ext cx="2824764" cy="1204589"/>
+          </a:xfrm>
+          <a:prstGeom prst="bentConnector3">
+            <a:avLst>
+              <a:gd name="adj1" fmla="val 95021"/>
+            </a:avLst>
+          </a:prstGeom>
+          <a:ln w="31750">
+            <a:tailEnd type="triangle" w="lg" len="med"/>
+          </a:ln>
+        </p:spPr>
+        <p:style>
+          <a:lnRef idx="1">
+            <a:schemeClr val="accent1"/>
+          </a:lnRef>
+          <a:fillRef idx="0">
+            <a:schemeClr val="accent1"/>
+          </a:fillRef>
+          <a:effectRef idx="0">
+            <a:schemeClr val="accent1"/>
+          </a:effectRef>
+          <a:fontRef idx="minor">
+            <a:schemeClr val="tx1"/>
+          </a:fontRef>
+        </p:style>
+      </p:cxnSp>
+      <p:sp>
+        <p:nvSpPr>
+          <p:cNvPr id="35" name="Document 34">
+            <a:extLst>
+              <a:ext uri="{FF2B5EF4-FFF2-40B4-BE49-F238E27FC236}">
+                <a16:creationId xmlns:a16="http://schemas.microsoft.com/office/drawing/2014/main" id="{62B9F02D-E1F9-7746-9A1D-03DA32D96D04}"/>
               </a:ext>
             </a:extLst>
           </p:cNvPr>
@@ -4922,7 +4891,7 @@
     </p:spTree>
     <p:extLst>
       <p:ext uri="{BB962C8B-B14F-4D97-AF65-F5344CB8AC3E}">
-        <p14:creationId xmlns:p14="http://schemas.microsoft.com/office/powerpoint/2010/main" val="2030031"/>
+        <p14:creationId xmlns:p14="http://schemas.microsoft.com/office/powerpoint/2010/main" val="4039719640"/>
       </p:ext>
     </p:extLst>
   </p:cSld>

</xml_diff>

<commit_message>
Increase right margin in pipeline output files
Edited in PowerPoint for Mac, exported as PDF.
PDF cropped in Preview and converted to SVG
with Inkscape 1.1 as follows:

$ /Applications/Inkscape.app/Contents/MacOS/inkscape --export-filename=pipeline.svg pipeline.pdf

$ /Applications/Inkscape.app/Contents/MacOS/inkscape --export-filename=pipeline-meta.svg pipeline-meta.pdf

See issue #358 on problems with this figure on
ReadTheDocs.
</commit_message>
<xml_diff>
--- a/docs/images/pipeline-meta.pptx
+++ b/docs/images/pipeline-meta.pptx
@@ -259,7 +259,7 @@
           <a:p>
             <a:fld id="{9BF4B002-F650-8A49-9257-AF48A4E75ECF}" type="datetimeFigureOut">
               <a:rPr lang="en-US" smtClean="0"/>
-              <a:t>7/5/21</a:t>
+              <a:t>7/8/21</a:t>
             </a:fld>
             <a:endParaRPr lang="en-US"/>
           </a:p>
@@ -457,7 +457,7 @@
           <a:p>
             <a:fld id="{9BF4B002-F650-8A49-9257-AF48A4E75ECF}" type="datetimeFigureOut">
               <a:rPr lang="en-US" smtClean="0"/>
-              <a:t>7/5/21</a:t>
+              <a:t>7/8/21</a:t>
             </a:fld>
             <a:endParaRPr lang="en-US"/>
           </a:p>
@@ -665,7 +665,7 @@
           <a:p>
             <a:fld id="{9BF4B002-F650-8A49-9257-AF48A4E75ECF}" type="datetimeFigureOut">
               <a:rPr lang="en-US" smtClean="0"/>
-              <a:t>7/5/21</a:t>
+              <a:t>7/8/21</a:t>
             </a:fld>
             <a:endParaRPr lang="en-US"/>
           </a:p>
@@ -863,7 +863,7 @@
           <a:p>
             <a:fld id="{9BF4B002-F650-8A49-9257-AF48A4E75ECF}" type="datetimeFigureOut">
               <a:rPr lang="en-US" smtClean="0"/>
-              <a:t>7/5/21</a:t>
+              <a:t>7/8/21</a:t>
             </a:fld>
             <a:endParaRPr lang="en-US"/>
           </a:p>
@@ -1138,7 +1138,7 @@
           <a:p>
             <a:fld id="{9BF4B002-F650-8A49-9257-AF48A4E75ECF}" type="datetimeFigureOut">
               <a:rPr lang="en-US" smtClean="0"/>
-              <a:t>7/5/21</a:t>
+              <a:t>7/8/21</a:t>
             </a:fld>
             <a:endParaRPr lang="en-US"/>
           </a:p>
@@ -1403,7 +1403,7 @@
           <a:p>
             <a:fld id="{9BF4B002-F650-8A49-9257-AF48A4E75ECF}" type="datetimeFigureOut">
               <a:rPr lang="en-US" smtClean="0"/>
-              <a:t>7/5/21</a:t>
+              <a:t>7/8/21</a:t>
             </a:fld>
             <a:endParaRPr lang="en-US"/>
           </a:p>
@@ -1815,7 +1815,7 @@
           <a:p>
             <a:fld id="{9BF4B002-F650-8A49-9257-AF48A4E75ECF}" type="datetimeFigureOut">
               <a:rPr lang="en-US" smtClean="0"/>
-              <a:t>7/5/21</a:t>
+              <a:t>7/8/21</a:t>
             </a:fld>
             <a:endParaRPr lang="en-US"/>
           </a:p>
@@ -1956,7 +1956,7 @@
           <a:p>
             <a:fld id="{9BF4B002-F650-8A49-9257-AF48A4E75ECF}" type="datetimeFigureOut">
               <a:rPr lang="en-US" smtClean="0"/>
-              <a:t>7/5/21</a:t>
+              <a:t>7/8/21</a:t>
             </a:fld>
             <a:endParaRPr lang="en-US"/>
           </a:p>
@@ -2069,7 +2069,7 @@
           <a:p>
             <a:fld id="{9BF4B002-F650-8A49-9257-AF48A4E75ECF}" type="datetimeFigureOut">
               <a:rPr lang="en-US" smtClean="0"/>
-              <a:t>7/5/21</a:t>
+              <a:t>7/8/21</a:t>
             </a:fld>
             <a:endParaRPr lang="en-US"/>
           </a:p>
@@ -2380,7 +2380,7 @@
           <a:p>
             <a:fld id="{9BF4B002-F650-8A49-9257-AF48A4E75ECF}" type="datetimeFigureOut">
               <a:rPr lang="en-US" smtClean="0"/>
-              <a:t>7/5/21</a:t>
+              <a:t>7/8/21</a:t>
             </a:fld>
             <a:endParaRPr lang="en-US"/>
           </a:p>
@@ -2668,7 +2668,7 @@
           <a:p>
             <a:fld id="{9BF4B002-F650-8A49-9257-AF48A4E75ECF}" type="datetimeFigureOut">
               <a:rPr lang="en-US" smtClean="0"/>
-              <a:t>7/5/21</a:t>
+              <a:t>7/8/21</a:t>
             </a:fld>
             <a:endParaRPr lang="en-US"/>
           </a:p>
@@ -2909,7 +2909,7 @@
           <a:p>
             <a:fld id="{9BF4B002-F650-8A49-9257-AF48A4E75ECF}" type="datetimeFigureOut">
               <a:rPr lang="en-US" smtClean="0"/>
-              <a:t>7/5/21</a:t>
+              <a:t>7/8/21</a:t>
             </a:fld>
             <a:endParaRPr lang="en-US"/>
           </a:p>
@@ -3328,6 +3328,247 @@
       </p:grpSpPr>
       <p:sp>
         <p:nvSpPr>
+          <p:cNvPr id="29" name="Rounded Rectangle 28">
+            <a:extLst>
+              <a:ext uri="{FF2B5EF4-FFF2-40B4-BE49-F238E27FC236}">
+                <a16:creationId xmlns:a16="http://schemas.microsoft.com/office/drawing/2014/main" id="{83CD056B-83E7-0541-9F17-AFF3C4FAC657}"/>
+              </a:ext>
+            </a:extLst>
+          </p:cNvPr>
+          <p:cNvSpPr/>
+          <p:nvPr/>
+        </p:nvSpPr>
+        <p:spPr>
+          <a:xfrm>
+            <a:off x="7122497" y="2162718"/>
+            <a:ext cx="2174883" cy="2873910"/>
+          </a:xfrm>
+          <a:prstGeom prst="roundRect">
+            <a:avLst/>
+          </a:prstGeom>
+          <a:solidFill>
+            <a:schemeClr val="accent2">
+              <a:lumMod val="20000"/>
+              <a:lumOff val="80000"/>
+            </a:schemeClr>
+          </a:solidFill>
+          <a:ln>
+            <a:solidFill>
+              <a:schemeClr val="accent2">
+                <a:lumMod val="75000"/>
+              </a:schemeClr>
+            </a:solidFill>
+          </a:ln>
+        </p:spPr>
+        <p:style>
+          <a:lnRef idx="2">
+            <a:schemeClr val="accent1">
+              <a:shade val="50000"/>
+            </a:schemeClr>
+          </a:lnRef>
+          <a:fillRef idx="1">
+            <a:schemeClr val="accent1"/>
+          </a:fillRef>
+          <a:effectRef idx="0">
+            <a:schemeClr val="accent1"/>
+          </a:effectRef>
+          <a:fontRef idx="minor">
+            <a:schemeClr val="lt1"/>
+          </a:fontRef>
+        </p:style>
+        <p:txBody>
+          <a:bodyPr bIns="0" rtlCol="0" anchor="b" anchorCtr="0"/>
+          <a:lstStyle/>
+          <a:p>
+            <a:pPr algn="ctr"/>
+            <a:r>
+              <a:rPr lang="en-US" dirty="0">
+                <a:solidFill>
+                  <a:schemeClr val="accent2">
+                    <a:lumMod val="75000"/>
+                  </a:schemeClr>
+                </a:solidFill>
+              </a:rPr>
+              <a:t>Output files</a:t>
+            </a:r>
+          </a:p>
+        </p:txBody>
+      </p:sp>
+      <p:sp>
+        <p:nvSpPr>
+          <p:cNvPr id="30" name="Document 29">
+            <a:extLst>
+              <a:ext uri="{FF2B5EF4-FFF2-40B4-BE49-F238E27FC236}">
+                <a16:creationId xmlns:a16="http://schemas.microsoft.com/office/drawing/2014/main" id="{C1D27143-0972-E542-9D84-DEE61C4D46EB}"/>
+              </a:ext>
+            </a:extLst>
+          </p:cNvPr>
+          <p:cNvSpPr/>
+          <p:nvPr/>
+        </p:nvSpPr>
+        <p:spPr>
+          <a:xfrm>
+            <a:off x="7291944" y="2364968"/>
+            <a:ext cx="1821979" cy="810000"/>
+          </a:xfrm>
+          <a:prstGeom prst="flowChartDocument">
+            <a:avLst/>
+          </a:prstGeom>
+          <a:solidFill>
+            <a:schemeClr val="accent2">
+              <a:lumMod val="40000"/>
+              <a:lumOff val="60000"/>
+            </a:schemeClr>
+          </a:solidFill>
+          <a:ln>
+            <a:solidFill>
+              <a:schemeClr val="tx1">
+                <a:lumMod val="95000"/>
+                <a:lumOff val="5000"/>
+              </a:schemeClr>
+            </a:solidFill>
+          </a:ln>
+        </p:spPr>
+        <p:style>
+          <a:lnRef idx="2">
+            <a:schemeClr val="accent1">
+              <a:shade val="50000"/>
+            </a:schemeClr>
+          </a:lnRef>
+          <a:fillRef idx="1">
+            <a:schemeClr val="accent1"/>
+          </a:fillRef>
+          <a:effectRef idx="0">
+            <a:schemeClr val="accent1"/>
+          </a:effectRef>
+          <a:fontRef idx="minor">
+            <a:schemeClr val="lt1"/>
+          </a:fontRef>
+        </p:style>
+        <p:txBody>
+          <a:bodyPr rtlCol="0" anchor="t" anchorCtr="0"/>
+          <a:lstStyle/>
+          <a:p>
+            <a:pPr algn="ctr"/>
+            <a:r>
+              <a:rPr lang="en-US" dirty="0">
+                <a:solidFill>
+                  <a:schemeClr val="tx1">
+                    <a:lumMod val="95000"/>
+                    <a:lumOff val="5000"/>
+                  </a:schemeClr>
+                </a:solidFill>
+              </a:rPr>
+              <a:t>XGMML graph</a:t>
+            </a:r>
+          </a:p>
+          <a:p>
+            <a:pPr algn="ctr"/>
+            <a:r>
+              <a:rPr lang="en-US" dirty="0">
+                <a:solidFill>
+                  <a:schemeClr val="tx1">
+                    <a:lumMod val="95000"/>
+                    <a:lumOff val="5000"/>
+                  </a:schemeClr>
+                </a:solidFill>
+              </a:rPr>
+              <a:t>for </a:t>
+            </a:r>
+            <a:r>
+              <a:rPr lang="en-US" dirty="0" err="1">
+                <a:solidFill>
+                  <a:schemeClr val="tx1">
+                    <a:lumMod val="95000"/>
+                    <a:lumOff val="5000"/>
+                  </a:schemeClr>
+                </a:solidFill>
+              </a:rPr>
+              <a:t>Cytoscape</a:t>
+            </a:r>
+            <a:endParaRPr lang="en-US" dirty="0">
+              <a:solidFill>
+                <a:schemeClr val="tx1">
+                  <a:lumMod val="95000"/>
+                  <a:lumOff val="5000"/>
+                </a:schemeClr>
+              </a:solidFill>
+            </a:endParaRPr>
+          </a:p>
+        </p:txBody>
+      </p:sp>
+      <p:sp>
+        <p:nvSpPr>
+          <p:cNvPr id="31" name="Document 30">
+            <a:extLst>
+              <a:ext uri="{FF2B5EF4-FFF2-40B4-BE49-F238E27FC236}">
+                <a16:creationId xmlns:a16="http://schemas.microsoft.com/office/drawing/2014/main" id="{9177305A-B5D5-3249-A0CA-92C52D09A8A3}"/>
+              </a:ext>
+            </a:extLst>
+          </p:cNvPr>
+          <p:cNvSpPr/>
+          <p:nvPr/>
+        </p:nvSpPr>
+        <p:spPr>
+          <a:xfrm>
+            <a:off x="7291944" y="3862375"/>
+            <a:ext cx="1821979" cy="810000"/>
+          </a:xfrm>
+          <a:prstGeom prst="flowChartDocument">
+            <a:avLst/>
+          </a:prstGeom>
+          <a:solidFill>
+            <a:schemeClr val="accent2">
+              <a:lumMod val="40000"/>
+              <a:lumOff val="60000"/>
+            </a:schemeClr>
+          </a:solidFill>
+          <a:ln>
+            <a:solidFill>
+              <a:schemeClr val="tx1">
+                <a:lumMod val="95000"/>
+                <a:lumOff val="5000"/>
+              </a:schemeClr>
+            </a:solidFill>
+          </a:ln>
+        </p:spPr>
+        <p:style>
+          <a:lnRef idx="2">
+            <a:schemeClr val="accent1">
+              <a:shade val="50000"/>
+            </a:schemeClr>
+          </a:lnRef>
+          <a:fillRef idx="1">
+            <a:schemeClr val="accent1"/>
+          </a:fillRef>
+          <a:effectRef idx="0">
+            <a:schemeClr val="accent1"/>
+          </a:effectRef>
+          <a:fontRef idx="minor">
+            <a:schemeClr val="lt1"/>
+          </a:fontRef>
+        </p:style>
+        <p:txBody>
+          <a:bodyPr rtlCol="0" anchor="t" anchorCtr="0"/>
+          <a:lstStyle/>
+          <a:p>
+            <a:pPr algn="ctr"/>
+            <a:r>
+              <a:rPr lang="en-US" dirty="0">
+                <a:solidFill>
+                  <a:schemeClr val="tx1">
+                    <a:lumMod val="95000"/>
+                    <a:lumOff val="5000"/>
+                  </a:schemeClr>
+                </a:solidFill>
+              </a:rPr>
+              <a:t>TXT, TSV, and Excel reports</a:t>
+            </a:r>
+          </a:p>
+        </p:txBody>
+      </p:sp>
+      <p:sp>
+        <p:nvSpPr>
           <p:cNvPr id="27" name="Rounded Rectangle 26">
             <a:extLst>
               <a:ext uri="{FF2B5EF4-FFF2-40B4-BE49-F238E27FC236}">
@@ -3390,74 +3631,6 @@
                 </a:solidFill>
               </a:rPr>
               <a:t>Input files</a:t>
-            </a:r>
-          </a:p>
-        </p:txBody>
-      </p:sp>
-      <p:sp>
-        <p:nvSpPr>
-          <p:cNvPr id="26" name="Rounded Rectangle 25">
-            <a:extLst>
-              <a:ext uri="{FF2B5EF4-FFF2-40B4-BE49-F238E27FC236}">
-                <a16:creationId xmlns:a16="http://schemas.microsoft.com/office/drawing/2014/main" id="{DB27987B-F7B6-D74E-BC65-C1D8812F731F}"/>
-              </a:ext>
-            </a:extLst>
-          </p:cNvPr>
-          <p:cNvSpPr/>
-          <p:nvPr/>
-        </p:nvSpPr>
-        <p:spPr>
-          <a:xfrm>
-            <a:off x="7123354" y="2160150"/>
-            <a:ext cx="1991426" cy="2873910"/>
-          </a:xfrm>
-          <a:prstGeom prst="roundRect">
-            <a:avLst/>
-          </a:prstGeom>
-          <a:solidFill>
-            <a:schemeClr val="accent2">
-              <a:lumMod val="20000"/>
-              <a:lumOff val="80000"/>
-            </a:schemeClr>
-          </a:solidFill>
-          <a:ln>
-            <a:solidFill>
-              <a:schemeClr val="accent2">
-                <a:lumMod val="75000"/>
-              </a:schemeClr>
-            </a:solidFill>
-          </a:ln>
-        </p:spPr>
-        <p:style>
-          <a:lnRef idx="2">
-            <a:schemeClr val="accent1">
-              <a:shade val="50000"/>
-            </a:schemeClr>
-          </a:lnRef>
-          <a:fillRef idx="1">
-            <a:schemeClr val="accent1"/>
-          </a:fillRef>
-          <a:effectRef idx="0">
-            <a:schemeClr val="accent1"/>
-          </a:effectRef>
-          <a:fontRef idx="minor">
-            <a:schemeClr val="lt1"/>
-          </a:fontRef>
-        </p:style>
-        <p:txBody>
-          <a:bodyPr bIns="0" rtlCol="0" anchor="b" anchorCtr="0"/>
-          <a:lstStyle/>
-          <a:p>
-            <a:pPr algn="ctr"/>
-            <a:r>
-              <a:rPr lang="en-US" dirty="0">
-                <a:solidFill>
-                  <a:schemeClr val="accent2">
-                    <a:lumMod val="75000"/>
-                  </a:schemeClr>
-                </a:solidFill>
-              </a:rPr>
-              <a:t>Output files</a:t>
             </a:r>
           </a:p>
         </p:txBody>
@@ -4444,179 +4617,6 @@
           </a:fontRef>
         </p:style>
       </p:cxnSp>
-      <p:sp>
-        <p:nvSpPr>
-          <p:cNvPr id="145" name="Document 144">
-            <a:extLst>
-              <a:ext uri="{FF2B5EF4-FFF2-40B4-BE49-F238E27FC236}">
-                <a16:creationId xmlns:a16="http://schemas.microsoft.com/office/drawing/2014/main" id="{9ADFCDE7-9EB0-2F4E-A449-9BAE26E58B05}"/>
-              </a:ext>
-            </a:extLst>
-          </p:cNvPr>
-          <p:cNvSpPr/>
-          <p:nvPr/>
-        </p:nvSpPr>
-        <p:spPr>
-          <a:xfrm>
-            <a:off x="7292801" y="2362400"/>
-            <a:ext cx="1620000" cy="810000"/>
-          </a:xfrm>
-          <a:prstGeom prst="flowChartDocument">
-            <a:avLst/>
-          </a:prstGeom>
-          <a:solidFill>
-            <a:schemeClr val="accent2">
-              <a:lumMod val="40000"/>
-              <a:lumOff val="60000"/>
-            </a:schemeClr>
-          </a:solidFill>
-          <a:ln>
-            <a:solidFill>
-              <a:schemeClr val="tx1">
-                <a:lumMod val="95000"/>
-                <a:lumOff val="5000"/>
-              </a:schemeClr>
-            </a:solidFill>
-          </a:ln>
-        </p:spPr>
-        <p:style>
-          <a:lnRef idx="2">
-            <a:schemeClr val="accent1">
-              <a:shade val="50000"/>
-            </a:schemeClr>
-          </a:lnRef>
-          <a:fillRef idx="1">
-            <a:schemeClr val="accent1"/>
-          </a:fillRef>
-          <a:effectRef idx="0">
-            <a:schemeClr val="accent1"/>
-          </a:effectRef>
-          <a:fontRef idx="minor">
-            <a:schemeClr val="lt1"/>
-          </a:fontRef>
-        </p:style>
-        <p:txBody>
-          <a:bodyPr rtlCol="0" anchor="t" anchorCtr="0"/>
-          <a:lstStyle/>
-          <a:p>
-            <a:pPr algn="ctr"/>
-            <a:r>
-              <a:rPr lang="en-US" dirty="0">
-                <a:solidFill>
-                  <a:schemeClr val="tx1">
-                    <a:lumMod val="95000"/>
-                    <a:lumOff val="5000"/>
-                  </a:schemeClr>
-                </a:solidFill>
-              </a:rPr>
-              <a:t>XGMML graph</a:t>
-            </a:r>
-          </a:p>
-          <a:p>
-            <a:pPr algn="ctr"/>
-            <a:r>
-              <a:rPr lang="en-US" dirty="0">
-                <a:solidFill>
-                  <a:schemeClr val="tx1">
-                    <a:lumMod val="95000"/>
-                    <a:lumOff val="5000"/>
-                  </a:schemeClr>
-                </a:solidFill>
-              </a:rPr>
-              <a:t>for </a:t>
-            </a:r>
-            <a:r>
-              <a:rPr lang="en-US" dirty="0" err="1">
-                <a:solidFill>
-                  <a:schemeClr val="tx1">
-                    <a:lumMod val="95000"/>
-                    <a:lumOff val="5000"/>
-                  </a:schemeClr>
-                </a:solidFill>
-              </a:rPr>
-              <a:t>Cytoscape</a:t>
-            </a:r>
-            <a:endParaRPr lang="en-US" dirty="0">
-              <a:solidFill>
-                <a:schemeClr val="tx1">
-                  <a:lumMod val="95000"/>
-                  <a:lumOff val="5000"/>
-                </a:schemeClr>
-              </a:solidFill>
-            </a:endParaRPr>
-          </a:p>
-        </p:txBody>
-      </p:sp>
-      <p:sp>
-        <p:nvSpPr>
-          <p:cNvPr id="146" name="Document 145">
-            <a:extLst>
-              <a:ext uri="{FF2B5EF4-FFF2-40B4-BE49-F238E27FC236}">
-                <a16:creationId xmlns:a16="http://schemas.microsoft.com/office/drawing/2014/main" id="{AEC571A3-A1BE-B342-85C1-B2C0ADC6A46E}"/>
-              </a:ext>
-            </a:extLst>
-          </p:cNvPr>
-          <p:cNvSpPr/>
-          <p:nvPr/>
-        </p:nvSpPr>
-        <p:spPr>
-          <a:xfrm>
-            <a:off x="7292801" y="3859807"/>
-            <a:ext cx="1620000" cy="810000"/>
-          </a:xfrm>
-          <a:prstGeom prst="flowChartDocument">
-            <a:avLst/>
-          </a:prstGeom>
-          <a:solidFill>
-            <a:schemeClr val="accent2">
-              <a:lumMod val="40000"/>
-              <a:lumOff val="60000"/>
-            </a:schemeClr>
-          </a:solidFill>
-          <a:ln>
-            <a:solidFill>
-              <a:schemeClr val="tx1">
-                <a:lumMod val="95000"/>
-                <a:lumOff val="5000"/>
-              </a:schemeClr>
-            </a:solidFill>
-          </a:ln>
-        </p:spPr>
-        <p:style>
-          <a:lnRef idx="2">
-            <a:schemeClr val="accent1">
-              <a:shade val="50000"/>
-            </a:schemeClr>
-          </a:lnRef>
-          <a:fillRef idx="1">
-            <a:schemeClr val="accent1"/>
-          </a:fillRef>
-          <a:effectRef idx="0">
-            <a:schemeClr val="accent1"/>
-          </a:effectRef>
-          <a:fontRef idx="minor">
-            <a:schemeClr val="lt1"/>
-          </a:fontRef>
-        </p:style>
-        <p:txBody>
-          <a:bodyPr rtlCol="0" anchor="t" anchorCtr="0"/>
-          <a:lstStyle/>
-          <a:p>
-            <a:pPr algn="ctr"/>
-            <a:r>
-              <a:rPr lang="en-US" dirty="0">
-                <a:solidFill>
-                  <a:schemeClr val="tx1">
-                    <a:lumMod val="95000"/>
-                    <a:lumOff val="5000"/>
-                  </a:schemeClr>
-                </a:solidFill>
-              </a:rPr>
-              <a:t>TXT, TSV, and Excel reports</a:t>
-            </a:r>
-          </a:p>
-        </p:txBody>
-      </p:sp>
       <p:cxnSp>
         <p:nvCxnSpPr>
           <p:cNvPr id="147" name="Straight Arrow Connector 146">
@@ -4629,14 +4629,14 @@
           <p:cNvCxnSpPr>
             <a:cxnSpLocks/>
             <a:stCxn id="62" idx="3"/>
-            <a:endCxn id="145" idx="1"/>
+            <a:endCxn id="30" idx="1"/>
           </p:cNvCxnSpPr>
           <p:nvPr/>
         </p:nvCxnSpPr>
         <p:spPr>
-          <a:xfrm flipV="1">
-            <a:off x="6839016" y="2767400"/>
-            <a:ext cx="453785" cy="397"/>
+          <a:xfrm>
+            <a:off x="6839016" y="2767797"/>
+            <a:ext cx="452928" cy="2171"/>
           </a:xfrm>
           <a:prstGeom prst="straightConnector1">
             <a:avLst/>
@@ -4672,14 +4672,14 @@
           <p:cNvCxnSpPr>
             <a:cxnSpLocks/>
             <a:stCxn id="43" idx="3"/>
-            <a:endCxn id="146" idx="1"/>
+            <a:endCxn id="31" idx="1"/>
           </p:cNvCxnSpPr>
           <p:nvPr/>
         </p:nvCxnSpPr>
         <p:spPr>
           <a:xfrm>
             <a:off x="6839016" y="4264807"/>
-            <a:ext cx="453785" cy="0"/>
+            <a:ext cx="452928" cy="2568"/>
           </a:xfrm>
           <a:prstGeom prst="straightConnector1">
             <a:avLst/>

</xml_diff>

<commit_message>
Update the pipeline figure with tally step
Edited in PowerPoint for Mac, exported as PDF.
PDF cropped in Preview and converted to SVG
with Inkscape 1.1 as follows:

$ /Applications/Inkscape.app/Contents/MacOS/inkscape --export-filename=pipeline.svg pipeline.pdf

$ /Applications/Inkscape.app/Contents/MacOS/inkscape --export-filename=pipeline-meta.svg pipeline-meta.pdf

See issue #358 for previous issues with figure
text.
</commit_message>
<xml_diff>
--- a/docs/images/pipeline-meta.pptx
+++ b/docs/images/pipeline-meta.pptx
@@ -259,7 +259,7 @@
           <a:p>
             <a:fld id="{9BF4B002-F650-8A49-9257-AF48A4E75ECF}" type="datetimeFigureOut">
               <a:rPr lang="en-US" smtClean="0"/>
-              <a:t>7/8/21</a:t>
+              <a:t>12/1/22</a:t>
             </a:fld>
             <a:endParaRPr lang="en-US"/>
           </a:p>
@@ -457,7 +457,7 @@
           <a:p>
             <a:fld id="{9BF4B002-F650-8A49-9257-AF48A4E75ECF}" type="datetimeFigureOut">
               <a:rPr lang="en-US" smtClean="0"/>
-              <a:t>7/8/21</a:t>
+              <a:t>12/1/22</a:t>
             </a:fld>
             <a:endParaRPr lang="en-US"/>
           </a:p>
@@ -665,7 +665,7 @@
           <a:p>
             <a:fld id="{9BF4B002-F650-8A49-9257-AF48A4E75ECF}" type="datetimeFigureOut">
               <a:rPr lang="en-US" smtClean="0"/>
-              <a:t>7/8/21</a:t>
+              <a:t>12/1/22</a:t>
             </a:fld>
             <a:endParaRPr lang="en-US"/>
           </a:p>
@@ -863,7 +863,7 @@
           <a:p>
             <a:fld id="{9BF4B002-F650-8A49-9257-AF48A4E75ECF}" type="datetimeFigureOut">
               <a:rPr lang="en-US" smtClean="0"/>
-              <a:t>7/8/21</a:t>
+              <a:t>12/1/22</a:t>
             </a:fld>
             <a:endParaRPr lang="en-US"/>
           </a:p>
@@ -1138,7 +1138,7 @@
           <a:p>
             <a:fld id="{9BF4B002-F650-8A49-9257-AF48A4E75ECF}" type="datetimeFigureOut">
               <a:rPr lang="en-US" smtClean="0"/>
-              <a:t>7/8/21</a:t>
+              <a:t>12/1/22</a:t>
             </a:fld>
             <a:endParaRPr lang="en-US"/>
           </a:p>
@@ -1403,7 +1403,7 @@
           <a:p>
             <a:fld id="{9BF4B002-F650-8A49-9257-AF48A4E75ECF}" type="datetimeFigureOut">
               <a:rPr lang="en-US" smtClean="0"/>
-              <a:t>7/8/21</a:t>
+              <a:t>12/1/22</a:t>
             </a:fld>
             <a:endParaRPr lang="en-US"/>
           </a:p>
@@ -1815,7 +1815,7 @@
           <a:p>
             <a:fld id="{9BF4B002-F650-8A49-9257-AF48A4E75ECF}" type="datetimeFigureOut">
               <a:rPr lang="en-US" smtClean="0"/>
-              <a:t>7/8/21</a:t>
+              <a:t>12/1/22</a:t>
             </a:fld>
             <a:endParaRPr lang="en-US"/>
           </a:p>
@@ -1956,7 +1956,7 @@
           <a:p>
             <a:fld id="{9BF4B002-F650-8A49-9257-AF48A4E75ECF}" type="datetimeFigureOut">
               <a:rPr lang="en-US" smtClean="0"/>
-              <a:t>7/8/21</a:t>
+              <a:t>12/1/22</a:t>
             </a:fld>
             <a:endParaRPr lang="en-US"/>
           </a:p>
@@ -2069,7 +2069,7 @@
           <a:p>
             <a:fld id="{9BF4B002-F650-8A49-9257-AF48A4E75ECF}" type="datetimeFigureOut">
               <a:rPr lang="en-US" smtClean="0"/>
-              <a:t>7/8/21</a:t>
+              <a:t>12/1/22</a:t>
             </a:fld>
             <a:endParaRPr lang="en-US"/>
           </a:p>
@@ -2380,7 +2380,7 @@
           <a:p>
             <a:fld id="{9BF4B002-F650-8A49-9257-AF48A4E75ECF}" type="datetimeFigureOut">
               <a:rPr lang="en-US" smtClean="0"/>
-              <a:t>7/8/21</a:t>
+              <a:t>12/1/22</a:t>
             </a:fld>
             <a:endParaRPr lang="en-US"/>
           </a:p>
@@ -2668,7 +2668,7 @@
           <a:p>
             <a:fld id="{9BF4B002-F650-8A49-9257-AF48A4E75ECF}" type="datetimeFigureOut">
               <a:rPr lang="en-US" smtClean="0"/>
-              <a:t>7/8/21</a:t>
+              <a:t>12/1/22</a:t>
             </a:fld>
             <a:endParaRPr lang="en-US"/>
           </a:p>
@@ -2909,7 +2909,7 @@
           <a:p>
             <a:fld id="{9BF4B002-F650-8A49-9257-AF48A4E75ECF}" type="datetimeFigureOut">
               <a:rPr lang="en-US" smtClean="0"/>
-              <a:t>7/8/21</a:t>
+              <a:t>12/1/22</a:t>
             </a:fld>
             <a:endParaRPr lang="en-US"/>
           </a:p>
@@ -3328,10 +3328,10 @@
       </p:grpSpPr>
       <p:sp>
         <p:nvSpPr>
-          <p:cNvPr id="29" name="Rounded Rectangle 28">
-            <a:extLst>
-              <a:ext uri="{FF2B5EF4-FFF2-40B4-BE49-F238E27FC236}">
-                <a16:creationId xmlns:a16="http://schemas.microsoft.com/office/drawing/2014/main" id="{83CD056B-83E7-0541-9F17-AFF3C4FAC657}"/>
+          <p:cNvPr id="3" name="Rounded Rectangle 2">
+            <a:extLst>
+              <a:ext uri="{FF2B5EF4-FFF2-40B4-BE49-F238E27FC236}">
+                <a16:creationId xmlns:a16="http://schemas.microsoft.com/office/drawing/2014/main" id="{CB5DADF2-B5F4-484B-A838-21FF856A3A11}"/>
               </a:ext>
             </a:extLst>
           </p:cNvPr>
@@ -3340,8 +3340,118 @@
         </p:nvSpPr>
         <p:spPr>
           <a:xfrm>
-            <a:off x="7122497" y="2162718"/>
-            <a:ext cx="2174883" cy="2873910"/>
+            <a:off x="2346325" y="2162718"/>
+            <a:ext cx="2118168" cy="3744865"/>
+          </a:xfrm>
+          <a:prstGeom prst="roundRect">
+            <a:avLst/>
+          </a:prstGeom>
+          <a:solidFill>
+            <a:schemeClr val="accent4">
+              <a:lumMod val="20000"/>
+              <a:lumOff val="80000"/>
+            </a:schemeClr>
+          </a:solidFill>
+          <a:ln>
+            <a:solidFill>
+              <a:schemeClr val="accent4">
+                <a:lumMod val="75000"/>
+              </a:schemeClr>
+            </a:solidFill>
+          </a:ln>
+        </p:spPr>
+        <p:style>
+          <a:lnRef idx="2">
+            <a:schemeClr val="accent1">
+              <a:shade val="50000"/>
+            </a:schemeClr>
+          </a:lnRef>
+          <a:fillRef idx="1">
+            <a:schemeClr val="accent1"/>
+          </a:fillRef>
+          <a:effectRef idx="0">
+            <a:schemeClr val="accent1"/>
+          </a:effectRef>
+          <a:fontRef idx="minor">
+            <a:schemeClr val="lt1"/>
+          </a:fontRef>
+        </p:style>
+        <p:txBody>
+          <a:bodyPr bIns="0" rtlCol="0" anchor="b" anchorCtr="0"/>
+          <a:lstStyle/>
+          <a:p>
+            <a:pPr algn="ctr"/>
+            <a:r>
+              <a:rPr lang="en-US" dirty="0">
+                <a:solidFill>
+                  <a:schemeClr val="accent4">
+                    <a:lumMod val="75000"/>
+                  </a:schemeClr>
+                </a:solidFill>
+              </a:rPr>
+              <a:t>Intermediate files</a:t>
+            </a:r>
+          </a:p>
+        </p:txBody>
+      </p:sp>
+      <p:cxnSp>
+        <p:nvCxnSpPr>
+          <p:cNvPr id="11" name="Straight Arrow Connector 10">
+            <a:extLst>
+              <a:ext uri="{FF2B5EF4-FFF2-40B4-BE49-F238E27FC236}">
+                <a16:creationId xmlns:a16="http://schemas.microsoft.com/office/drawing/2014/main" id="{94992B5C-A17E-E757-8D43-A455507290A6}"/>
+              </a:ext>
+            </a:extLst>
+          </p:cNvPr>
+          <p:cNvCxnSpPr>
+            <a:cxnSpLocks/>
+            <a:endCxn id="2" idx="0"/>
+          </p:cNvCxnSpPr>
+          <p:nvPr/>
+        </p:nvCxnSpPr>
+        <p:spPr>
+          <a:xfrm>
+            <a:off x="3457181" y="4063029"/>
+            <a:ext cx="0" cy="411314"/>
+          </a:xfrm>
+          <a:prstGeom prst="straightConnector1">
+            <a:avLst/>
+          </a:prstGeom>
+          <a:ln w="31750">
+            <a:tailEnd type="triangle" w="lg" len="med"/>
+          </a:ln>
+        </p:spPr>
+        <p:style>
+          <a:lnRef idx="1">
+            <a:schemeClr val="accent1"/>
+          </a:lnRef>
+          <a:fillRef idx="0">
+            <a:schemeClr val="accent1"/>
+          </a:fillRef>
+          <a:effectRef idx="0">
+            <a:schemeClr val="accent1"/>
+          </a:effectRef>
+          <a:fontRef idx="minor">
+            <a:schemeClr val="tx1"/>
+          </a:fontRef>
+        </p:style>
+      </p:cxnSp>
+      <p:sp>
+        <p:nvSpPr>
+          <p:cNvPr id="29" name="Rounded Rectangle 28">
+            <a:extLst>
+              <a:ext uri="{FF2B5EF4-FFF2-40B4-BE49-F238E27FC236}">
+                <a16:creationId xmlns:a16="http://schemas.microsoft.com/office/drawing/2014/main" id="{83CD056B-83E7-0541-9F17-AFF3C4FAC657}"/>
+              </a:ext>
+            </a:extLst>
+          </p:cNvPr>
+          <p:cNvSpPr/>
+          <p:nvPr/>
+        </p:nvSpPr>
+        <p:spPr>
+          <a:xfrm>
+            <a:off x="7218566" y="3202695"/>
+            <a:ext cx="2174883" cy="2704888"/>
           </a:xfrm>
           <a:prstGeom prst="roundRect">
             <a:avLst/>
@@ -3389,7 +3499,7 @@
                   </a:schemeClr>
                 </a:solidFill>
               </a:rPr>
-              <a:t>Output files</a:t>
+              <a:t>Report files</a:t>
             </a:r>
           </a:p>
         </p:txBody>
@@ -3408,8 +3518,8 @@
         </p:nvSpPr>
         <p:spPr>
           <a:xfrm>
-            <a:off x="7291944" y="2364968"/>
-            <a:ext cx="1821979" cy="810000"/>
+            <a:off x="7379089" y="3428718"/>
+            <a:ext cx="1899558" cy="513105"/>
           </a:xfrm>
           <a:prstGeom prst="flowChartDocument">
             <a:avLst/>
@@ -3459,41 +3569,8 @@
                   </a:schemeClr>
                 </a:solidFill>
               </a:rPr>
-              <a:t>XGMML graph</a:t>
-            </a:r>
-          </a:p>
-          <a:p>
-            <a:pPr algn="ctr"/>
-            <a:r>
-              <a:rPr lang="en-US" dirty="0">
-                <a:solidFill>
-                  <a:schemeClr val="tx1">
-                    <a:lumMod val="95000"/>
-                    <a:lumOff val="5000"/>
-                  </a:schemeClr>
-                </a:solidFill>
-              </a:rPr>
-              <a:t>for </a:t>
-            </a:r>
-            <a:r>
-              <a:rPr lang="en-US" dirty="0" err="1">
-                <a:solidFill>
-                  <a:schemeClr val="tx1">
-                    <a:lumMod val="95000"/>
-                    <a:lumOff val="5000"/>
-                  </a:schemeClr>
-                </a:solidFill>
-              </a:rPr>
-              <a:t>Cytoscape</a:t>
-            </a:r>
-            <a:endParaRPr lang="en-US" dirty="0">
-              <a:solidFill>
-                <a:schemeClr val="tx1">
-                  <a:lumMod val="95000"/>
-                  <a:lumOff val="5000"/>
-                </a:schemeClr>
-              </a:solidFill>
-            </a:endParaRPr>
+              <a:t>ASV vs species</a:t>
+            </a:r>
           </a:p>
         </p:txBody>
       </p:sp>
@@ -3511,8 +3588,8 @@
         </p:nvSpPr>
         <p:spPr>
           <a:xfrm>
-            <a:off x="7291944" y="3862375"/>
-            <a:ext cx="1821979" cy="810000"/>
+            <a:off x="7379089" y="4130417"/>
+            <a:ext cx="1899558" cy="513105"/>
           </a:xfrm>
           <a:prstGeom prst="flowChartDocument">
             <a:avLst/>
@@ -3562,7 +3639,7 @@
                   </a:schemeClr>
                 </a:solidFill>
               </a:rPr>
-              <a:t>TXT, TSV, and Excel reports</a:t>
+              <a:t>Sample vs species</a:t>
             </a:r>
           </a:p>
         </p:txBody>
@@ -3581,8 +3658,8 @@
         </p:nvSpPr>
         <p:spPr>
           <a:xfrm>
-            <a:off x="2056015" y="155169"/>
-            <a:ext cx="5658578" cy="1288871"/>
+            <a:off x="2148840" y="155169"/>
+            <a:ext cx="4411980" cy="1288871"/>
           </a:xfrm>
           <a:prstGeom prst="roundRect">
             <a:avLst/>
@@ -3637,10 +3714,10 @@
       </p:sp>
       <p:sp>
         <p:nvSpPr>
-          <p:cNvPr id="3" name="Rounded Rectangle 2">
-            <a:extLst>
-              <a:ext uri="{FF2B5EF4-FFF2-40B4-BE49-F238E27FC236}">
-                <a16:creationId xmlns:a16="http://schemas.microsoft.com/office/drawing/2014/main" id="{CB5DADF2-B5F4-484B-A838-21FF856A3A11}"/>
+          <p:cNvPr id="4" name="Multidocument 3">
+            <a:extLst>
+              <a:ext uri="{FF2B5EF4-FFF2-40B4-BE49-F238E27FC236}">
+                <a16:creationId xmlns:a16="http://schemas.microsoft.com/office/drawing/2014/main" id="{D44D42A9-9DCD-2548-876D-EC395E3ACB15}"/>
               </a:ext>
             </a:extLst>
           </p:cNvPr>
@@ -3649,75 +3726,7 @@
         </p:nvSpPr>
         <p:spPr>
           <a:xfrm>
-            <a:off x="2346324" y="2162718"/>
-            <a:ext cx="2221713" cy="2873910"/>
-          </a:xfrm>
-          <a:prstGeom prst="roundRect">
-            <a:avLst/>
-          </a:prstGeom>
-          <a:solidFill>
-            <a:schemeClr val="accent4">
-              <a:lumMod val="20000"/>
-              <a:lumOff val="80000"/>
-            </a:schemeClr>
-          </a:solidFill>
-          <a:ln>
-            <a:solidFill>
-              <a:schemeClr val="accent4">
-                <a:lumMod val="75000"/>
-              </a:schemeClr>
-            </a:solidFill>
-          </a:ln>
-        </p:spPr>
-        <p:style>
-          <a:lnRef idx="2">
-            <a:schemeClr val="accent1">
-              <a:shade val="50000"/>
-            </a:schemeClr>
-          </a:lnRef>
-          <a:fillRef idx="1">
-            <a:schemeClr val="accent1"/>
-          </a:fillRef>
-          <a:effectRef idx="0">
-            <a:schemeClr val="accent1"/>
-          </a:effectRef>
-          <a:fontRef idx="minor">
-            <a:schemeClr val="lt1"/>
-          </a:fontRef>
-        </p:style>
-        <p:txBody>
-          <a:bodyPr bIns="0" rtlCol="0" anchor="b" anchorCtr="0"/>
-          <a:lstStyle/>
-          <a:p>
-            <a:pPr algn="ctr"/>
-            <a:r>
-              <a:rPr lang="en-US" dirty="0">
-                <a:solidFill>
-                  <a:schemeClr val="accent4">
-                    <a:lumMod val="75000"/>
-                  </a:schemeClr>
-                </a:solidFill>
-              </a:rPr>
-              <a:t>Intermediate files</a:t>
-            </a:r>
-          </a:p>
-        </p:txBody>
-      </p:sp>
-      <p:sp>
-        <p:nvSpPr>
-          <p:cNvPr id="4" name="Multidocument 3">
-            <a:extLst>
-              <a:ext uri="{FF2B5EF4-FFF2-40B4-BE49-F238E27FC236}">
-                <a16:creationId xmlns:a16="http://schemas.microsoft.com/office/drawing/2014/main" id="{D44D42A9-9DCD-2548-876D-EC395E3ACB15}"/>
-              </a:ext>
-            </a:extLst>
-          </p:cNvPr>
-          <p:cNvSpPr/>
-          <p:nvPr/>
-        </p:nvSpPr>
-        <p:spPr>
-          <a:xfrm>
-            <a:off x="2166850" y="493216"/>
+            <a:off x="2281150" y="493216"/>
             <a:ext cx="1235041" cy="900000"/>
           </a:xfrm>
           <a:prstGeom prst="flowChartMultidocument">
@@ -3983,8 +3992,8 @@
         </p:nvCxnSpPr>
         <p:spPr>
           <a:xfrm rot="16200000" flipH="1">
-            <a:off x="2884727" y="1172894"/>
-            <a:ext cx="386217" cy="758693"/>
+            <a:off x="2941877" y="1230044"/>
+            <a:ext cx="386217" cy="644393"/>
           </a:xfrm>
           <a:prstGeom prst="bentConnector3">
             <a:avLst>
@@ -4053,57 +4062,6 @@
           </a:fontRef>
         </p:style>
       </p:cxnSp>
-      <p:sp>
-        <p:nvSpPr>
-          <p:cNvPr id="20" name="Predefined Process 19">
-            <a:extLst>
-              <a:ext uri="{FF2B5EF4-FFF2-40B4-BE49-F238E27FC236}">
-                <a16:creationId xmlns:a16="http://schemas.microsoft.com/office/drawing/2014/main" id="{6D0D1981-42F7-1243-9B82-BD7A2E4B3DA8}"/>
-              </a:ext>
-            </a:extLst>
-          </p:cNvPr>
-          <p:cNvSpPr/>
-          <p:nvPr/>
-        </p:nvSpPr>
-        <p:spPr>
-          <a:xfrm>
-            <a:off x="2588886" y="3351247"/>
-            <a:ext cx="1736592" cy="354625"/>
-          </a:xfrm>
-          <a:prstGeom prst="flowChartPredefinedProcess">
-            <a:avLst/>
-          </a:prstGeom>
-        </p:spPr>
-        <p:style>
-          <a:lnRef idx="2">
-            <a:schemeClr val="accent1">
-              <a:shade val="50000"/>
-            </a:schemeClr>
-          </a:lnRef>
-          <a:fillRef idx="1">
-            <a:schemeClr val="accent1"/>
-          </a:fillRef>
-          <a:effectRef idx="0">
-            <a:schemeClr val="accent1"/>
-          </a:effectRef>
-          <a:fontRef idx="minor">
-            <a:schemeClr val="lt1"/>
-          </a:fontRef>
-        </p:style>
-        <p:txBody>
-          <a:bodyPr rtlCol="0" anchor="ctr"/>
-          <a:lstStyle/>
-          <a:p>
-            <a:pPr algn="ctr"/>
-            <a:r>
-              <a:rPr lang="en-US" dirty="0">
-                <a:latin typeface="Andale Mono" panose="020B0509000000000004" pitchFamily="49" charset="0"/>
-              </a:rPr>
-              <a:t>classify</a:t>
-            </a:r>
-          </a:p>
-        </p:txBody>
-      </p:sp>
       <p:cxnSp>
         <p:nvCxnSpPr>
           <p:cNvPr id="22" name="Straight Arrow Connector 21">
@@ -4158,127 +4116,13 @@
           </p:cNvPr>
           <p:cNvCxnSpPr>
             <a:cxnSpLocks/>
-            <a:stCxn id="20" idx="2"/>
           </p:cNvCxnSpPr>
           <p:nvPr/>
         </p:nvCxnSpPr>
         <p:spPr>
           <a:xfrm>
-            <a:off x="3457182" y="3705872"/>
+            <a:off x="3457181" y="3514319"/>
             <a:ext cx="0" cy="333949"/>
-          </a:xfrm>
-          <a:prstGeom prst="straightConnector1">
-            <a:avLst/>
-          </a:prstGeom>
-          <a:ln w="31750">
-            <a:tailEnd type="triangle" w="lg" len="med"/>
-          </a:ln>
-        </p:spPr>
-        <p:style>
-          <a:lnRef idx="1">
-            <a:schemeClr val="accent1"/>
-          </a:lnRef>
-          <a:fillRef idx="0">
-            <a:schemeClr val="accent1"/>
-          </a:fillRef>
-          <a:effectRef idx="0">
-            <a:schemeClr val="accent1"/>
-          </a:effectRef>
-          <a:fontRef idx="minor">
-            <a:schemeClr val="tx1"/>
-          </a:fontRef>
-        </p:style>
-      </p:cxnSp>
-      <p:sp>
-        <p:nvSpPr>
-          <p:cNvPr id="39" name="Direct Access Storage 38">
-            <a:extLst>
-              <a:ext uri="{FF2B5EF4-FFF2-40B4-BE49-F238E27FC236}">
-                <a16:creationId xmlns:a16="http://schemas.microsoft.com/office/drawing/2014/main" id="{1E343600-653D-E140-9248-C69F229F6E8C}"/>
-              </a:ext>
-            </a:extLst>
-          </p:cNvPr>
-          <p:cNvSpPr/>
-          <p:nvPr/>
-        </p:nvSpPr>
-        <p:spPr>
-          <a:xfrm>
-            <a:off x="4710958" y="3205947"/>
-            <a:ext cx="2128058" cy="652838"/>
-          </a:xfrm>
-          <a:prstGeom prst="flowChartMagneticDrum">
-            <a:avLst/>
-          </a:prstGeom>
-          <a:solidFill>
-            <a:schemeClr val="accent1">
-              <a:lumMod val="40000"/>
-              <a:lumOff val="60000"/>
-            </a:schemeClr>
-          </a:solidFill>
-          <a:ln>
-            <a:solidFill>
-              <a:schemeClr val="tx1">
-                <a:lumMod val="95000"/>
-                <a:lumOff val="5000"/>
-              </a:schemeClr>
-            </a:solidFill>
-          </a:ln>
-        </p:spPr>
-        <p:style>
-          <a:lnRef idx="2">
-            <a:schemeClr val="accent1">
-              <a:shade val="50000"/>
-            </a:schemeClr>
-          </a:lnRef>
-          <a:fillRef idx="1">
-            <a:schemeClr val="accent1"/>
-          </a:fillRef>
-          <a:effectRef idx="0">
-            <a:schemeClr val="accent1"/>
-          </a:effectRef>
-          <a:fontRef idx="minor">
-            <a:schemeClr val="lt1"/>
-          </a:fontRef>
-        </p:style>
-        <p:txBody>
-          <a:bodyPr rtlCol="0" anchor="ctr"/>
-          <a:lstStyle/>
-          <a:p>
-            <a:pPr algn="ctr"/>
-            <a:r>
-              <a:rPr lang="en-US" dirty="0">
-                <a:solidFill>
-                  <a:schemeClr val="tx1">
-                    <a:lumMod val="95000"/>
-                    <a:lumOff val="5000"/>
-                  </a:schemeClr>
-                </a:solidFill>
-              </a:rPr>
-              <a:t>ITS1 Database</a:t>
-            </a:r>
-          </a:p>
-        </p:txBody>
-      </p:sp>
-      <p:cxnSp>
-        <p:nvCxnSpPr>
-          <p:cNvPr id="40" name="Straight Arrow Connector 39">
-            <a:extLst>
-              <a:ext uri="{FF2B5EF4-FFF2-40B4-BE49-F238E27FC236}">
-                <a16:creationId xmlns:a16="http://schemas.microsoft.com/office/drawing/2014/main" id="{C1C55D77-C6F0-6348-AD64-F1270D96C8A8}"/>
-              </a:ext>
-            </a:extLst>
-          </p:cNvPr>
-          <p:cNvCxnSpPr>
-            <a:cxnSpLocks/>
-            <a:stCxn id="39" idx="1"/>
-            <a:endCxn id="20" idx="3"/>
-          </p:cNvCxnSpPr>
-          <p:nvPr/>
-        </p:nvCxnSpPr>
-        <p:spPr>
-          <a:xfrm flipH="1" flipV="1">
-            <a:off x="4325478" y="3528560"/>
-            <a:ext cx="385480" cy="3806"/>
           </a:xfrm>
           <a:prstGeom prst="straightConnector1">
             <a:avLst/>
@@ -4400,8 +4244,8 @@
         </p:nvSpPr>
         <p:spPr>
           <a:xfrm>
-            <a:off x="4710958" y="4086691"/>
-            <a:ext cx="2128058" cy="356232"/>
+            <a:off x="4754088" y="4215020"/>
+            <a:ext cx="2174882" cy="356232"/>
           </a:xfrm>
           <a:prstGeom prst="flowChartPredefinedProcess">
             <a:avLst/>
@@ -4448,15 +4292,15 @@
           </p:cNvPr>
           <p:cNvCxnSpPr>
             <a:cxnSpLocks/>
-            <a:stCxn id="28" idx="3"/>
-            <a:endCxn id="43" idx="1"/>
+            <a:stCxn id="9" idx="3"/>
+            <a:endCxn id="145" idx="1"/>
           </p:cNvCxnSpPr>
           <p:nvPr/>
         </p:nvCxnSpPr>
         <p:spPr>
           <a:xfrm flipV="1">
-            <a:off x="4163961" y="4264807"/>
-            <a:ext cx="546997" cy="3700"/>
+            <a:off x="4163960" y="5264886"/>
+            <a:ext cx="601713" cy="1907"/>
           </a:xfrm>
           <a:prstGeom prst="straightConnector1">
             <a:avLst/>
@@ -4480,77 +4324,26 @@
           </a:fontRef>
         </p:style>
       </p:cxnSp>
-      <p:sp>
-        <p:nvSpPr>
-          <p:cNvPr id="62" name="Predefined Process 61">
-            <a:extLst>
-              <a:ext uri="{FF2B5EF4-FFF2-40B4-BE49-F238E27FC236}">
-                <a16:creationId xmlns:a16="http://schemas.microsoft.com/office/drawing/2014/main" id="{7013FA66-4919-A746-8849-FF5694458897}"/>
-              </a:ext>
-            </a:extLst>
-          </p:cNvPr>
-          <p:cNvSpPr/>
-          <p:nvPr/>
-        </p:nvSpPr>
-        <p:spPr>
-          <a:xfrm>
-            <a:off x="4710958" y="2591689"/>
-            <a:ext cx="2128058" cy="352215"/>
-          </a:xfrm>
-          <a:prstGeom prst="flowChartPredefinedProcess">
-            <a:avLst/>
-          </a:prstGeom>
-        </p:spPr>
-        <p:style>
-          <a:lnRef idx="2">
-            <a:schemeClr val="accent1">
-              <a:shade val="50000"/>
-            </a:schemeClr>
-          </a:lnRef>
-          <a:fillRef idx="1">
-            <a:schemeClr val="accent1"/>
-          </a:fillRef>
-          <a:effectRef idx="0">
-            <a:schemeClr val="accent1"/>
-          </a:effectRef>
-          <a:fontRef idx="minor">
-            <a:schemeClr val="lt1"/>
-          </a:fontRef>
-        </p:style>
-        <p:txBody>
-          <a:bodyPr rtlCol="0" anchor="ctr"/>
-          <a:lstStyle/>
-          <a:p>
-            <a:pPr algn="ctr"/>
-            <a:r>
-              <a:rPr lang="en-US" dirty="0">
-                <a:latin typeface="Andale Mono" panose="020B0509000000000004" pitchFamily="49" charset="0"/>
-              </a:rPr>
-              <a:t>edit-graph</a:t>
-            </a:r>
-          </a:p>
-        </p:txBody>
-      </p:sp>
       <p:cxnSp>
         <p:nvCxnSpPr>
-          <p:cNvPr id="63" name="Straight Arrow Connector 62">
-            <a:extLst>
-              <a:ext uri="{FF2B5EF4-FFF2-40B4-BE49-F238E27FC236}">
-                <a16:creationId xmlns:a16="http://schemas.microsoft.com/office/drawing/2014/main" id="{E096ADE7-A31A-3D4C-91CF-D2A366202D60}"/>
+          <p:cNvPr id="150" name="Straight Arrow Connector 149">
+            <a:extLst>
+              <a:ext uri="{FF2B5EF4-FFF2-40B4-BE49-F238E27FC236}">
+                <a16:creationId xmlns:a16="http://schemas.microsoft.com/office/drawing/2014/main" id="{A2DCFD74-FF9F-274F-850B-AF208EC79FF1}"/>
               </a:ext>
             </a:extLst>
           </p:cNvPr>
           <p:cNvCxnSpPr>
             <a:cxnSpLocks/>
-            <a:stCxn id="15" idx="3"/>
-            <a:endCxn id="62" idx="1"/>
+            <a:stCxn id="43" idx="3"/>
+            <a:endCxn id="31" idx="1"/>
           </p:cNvCxnSpPr>
           <p:nvPr/>
         </p:nvCxnSpPr>
         <p:spPr>
-          <a:xfrm>
-            <a:off x="4206007" y="2767400"/>
-            <a:ext cx="504951" cy="397"/>
+          <a:xfrm flipV="1">
+            <a:off x="6928970" y="4386970"/>
+            <a:ext cx="450119" cy="6166"/>
           </a:xfrm>
           <a:prstGeom prst="straightConnector1">
             <a:avLst/>
@@ -4574,150 +4367,21 @@
           </a:fontRef>
         </p:style>
       </p:cxnSp>
-      <p:cxnSp>
-        <p:nvCxnSpPr>
-          <p:cNvPr id="142" name="Straight Arrow Connector 141">
-            <a:extLst>
-              <a:ext uri="{FF2B5EF4-FFF2-40B4-BE49-F238E27FC236}">
-                <a16:creationId xmlns:a16="http://schemas.microsoft.com/office/drawing/2014/main" id="{78837652-7F47-2241-9483-A176E72A44F8}"/>
-              </a:ext>
-            </a:extLst>
-          </p:cNvPr>
-          <p:cNvCxnSpPr>
-            <a:cxnSpLocks/>
-            <a:stCxn id="39" idx="0"/>
-            <a:endCxn id="62" idx="2"/>
-          </p:cNvCxnSpPr>
+      <p:sp>
+        <p:nvSpPr>
+          <p:cNvPr id="28" name="Document 27">
+            <a:extLst>
+              <a:ext uri="{FF2B5EF4-FFF2-40B4-BE49-F238E27FC236}">
+                <a16:creationId xmlns:a16="http://schemas.microsoft.com/office/drawing/2014/main" id="{5C1A5AC8-640B-334C-B351-6D6A1593FEE0}"/>
+              </a:ext>
+            </a:extLst>
+          </p:cNvPr>
+          <p:cNvSpPr/>
           <p:nvPr/>
-        </p:nvCxnSpPr>
-        <p:spPr>
-          <a:xfrm flipV="1">
-            <a:off x="5774987" y="2943904"/>
-            <a:ext cx="0" cy="262043"/>
-          </a:xfrm>
-          <a:prstGeom prst="straightConnector1">
-            <a:avLst/>
-          </a:prstGeom>
-          <a:ln w="31750">
-            <a:tailEnd type="triangle" w="lg" len="med"/>
-          </a:ln>
-        </p:spPr>
-        <p:style>
-          <a:lnRef idx="1">
-            <a:schemeClr val="accent1"/>
-          </a:lnRef>
-          <a:fillRef idx="0">
-            <a:schemeClr val="accent1"/>
-          </a:fillRef>
-          <a:effectRef idx="0">
-            <a:schemeClr val="accent1"/>
-          </a:effectRef>
-          <a:fontRef idx="minor">
-            <a:schemeClr val="tx1"/>
-          </a:fontRef>
-        </p:style>
-      </p:cxnSp>
-      <p:cxnSp>
-        <p:nvCxnSpPr>
-          <p:cNvPr id="147" name="Straight Arrow Connector 146">
-            <a:extLst>
-              <a:ext uri="{FF2B5EF4-FFF2-40B4-BE49-F238E27FC236}">
-                <a16:creationId xmlns:a16="http://schemas.microsoft.com/office/drawing/2014/main" id="{414DF7DA-68BC-2A4E-B52B-0E5052F12DFB}"/>
-              </a:ext>
-            </a:extLst>
-          </p:cNvPr>
-          <p:cNvCxnSpPr>
-            <a:cxnSpLocks/>
-            <a:stCxn id="62" idx="3"/>
-            <a:endCxn id="30" idx="1"/>
-          </p:cNvCxnSpPr>
-          <p:nvPr/>
-        </p:nvCxnSpPr>
+        </p:nvSpPr>
         <p:spPr>
           <a:xfrm>
-            <a:off x="6839016" y="2767797"/>
-            <a:ext cx="452928" cy="2171"/>
-          </a:xfrm>
-          <a:prstGeom prst="straightConnector1">
-            <a:avLst/>
-          </a:prstGeom>
-          <a:ln w="31750">
-            <a:tailEnd type="triangle" w="lg" len="med"/>
-          </a:ln>
-        </p:spPr>
-        <p:style>
-          <a:lnRef idx="1">
-            <a:schemeClr val="accent1"/>
-          </a:lnRef>
-          <a:fillRef idx="0">
-            <a:schemeClr val="accent1"/>
-          </a:fillRef>
-          <a:effectRef idx="0">
-            <a:schemeClr val="accent1"/>
-          </a:effectRef>
-          <a:fontRef idx="minor">
-            <a:schemeClr val="tx1"/>
-          </a:fontRef>
-        </p:style>
-      </p:cxnSp>
-      <p:cxnSp>
-        <p:nvCxnSpPr>
-          <p:cNvPr id="150" name="Straight Arrow Connector 149">
-            <a:extLst>
-              <a:ext uri="{FF2B5EF4-FFF2-40B4-BE49-F238E27FC236}">
-                <a16:creationId xmlns:a16="http://schemas.microsoft.com/office/drawing/2014/main" id="{A2DCFD74-FF9F-274F-850B-AF208EC79FF1}"/>
-              </a:ext>
-            </a:extLst>
-          </p:cNvPr>
-          <p:cNvCxnSpPr>
-            <a:cxnSpLocks/>
-            <a:stCxn id="43" idx="3"/>
-            <a:endCxn id="31" idx="1"/>
-          </p:cNvCxnSpPr>
-          <p:nvPr/>
-        </p:nvCxnSpPr>
-        <p:spPr>
-          <a:xfrm>
-            <a:off x="6839016" y="4264807"/>
-            <a:ext cx="452928" cy="2568"/>
-          </a:xfrm>
-          <a:prstGeom prst="straightConnector1">
-            <a:avLst/>
-          </a:prstGeom>
-          <a:ln w="31750">
-            <a:tailEnd type="triangle" w="lg" len="med"/>
-          </a:ln>
-        </p:spPr>
-        <p:style>
-          <a:lnRef idx="1">
-            <a:schemeClr val="accent1"/>
-          </a:lnRef>
-          <a:fillRef idx="0">
-            <a:schemeClr val="accent1"/>
-          </a:fillRef>
-          <a:effectRef idx="0">
-            <a:schemeClr val="accent1"/>
-          </a:effectRef>
-          <a:fontRef idx="minor">
-            <a:schemeClr val="tx1"/>
-          </a:fontRef>
-        </p:style>
-      </p:cxnSp>
-      <p:sp>
-        <p:nvSpPr>
-          <p:cNvPr id="28" name="Document 27">
-            <a:extLst>
-              <a:ext uri="{FF2B5EF4-FFF2-40B4-BE49-F238E27FC236}">
-                <a16:creationId xmlns:a16="http://schemas.microsoft.com/office/drawing/2014/main" id="{5C1A5AC8-640B-334C-B351-6D6A1593FEE0}"/>
-              </a:ext>
-            </a:extLst>
-          </p:cNvPr>
-          <p:cNvSpPr/>
-          <p:nvPr/>
-        </p:nvSpPr>
-        <p:spPr>
-          <a:xfrm>
-            <a:off x="2543961" y="4039821"/>
+            <a:off x="2543961" y="3848268"/>
             <a:ext cx="1620000" cy="457371"/>
           </a:xfrm>
           <a:prstGeom prst="flowChartDocument">
@@ -4768,7 +4432,7 @@
                   </a:schemeClr>
                 </a:solidFill>
               </a:rPr>
-              <a:t>Pooled TSV</a:t>
+              <a:t>ASV/sample</a:t>
             </a:r>
           </a:p>
         </p:txBody>
@@ -4784,19 +4448,19 @@
           </p:cNvPr>
           <p:cNvCxnSpPr>
             <a:cxnSpLocks/>
-            <a:stCxn id="35" idx="2"/>
-            <a:endCxn id="43" idx="0"/>
+            <a:stCxn id="43" idx="3"/>
+            <a:endCxn id="30" idx="1"/>
           </p:cNvCxnSpPr>
           <p:nvPr/>
         </p:nvCxnSpPr>
         <p:spPr>
-          <a:xfrm rot="5400000">
-            <a:off x="4964900" y="2072015"/>
-            <a:ext cx="2824764" cy="1204589"/>
+          <a:xfrm flipV="1">
+            <a:off x="6928970" y="3685271"/>
+            <a:ext cx="450119" cy="707865"/>
           </a:xfrm>
           <a:prstGeom prst="bentConnector3">
             <a:avLst>
-              <a:gd name="adj1" fmla="val 95021"/>
+              <a:gd name="adj1" fmla="val 37303"/>
             </a:avLst>
           </a:prstGeom>
           <a:ln w="31750">
@@ -4832,8 +4496,8 @@
         </p:nvSpPr>
         <p:spPr>
           <a:xfrm>
-            <a:off x="6385576" y="505477"/>
-            <a:ext cx="1188000" cy="810000"/>
+            <a:off x="5278700" y="505137"/>
+            <a:ext cx="1125658" cy="810000"/>
           </a:xfrm>
           <a:prstGeom prst="flowChartDocument">
             <a:avLst/>
@@ -4888,6 +4552,482 @@
           </a:p>
         </p:txBody>
       </p:sp>
+      <p:sp>
+        <p:nvSpPr>
+          <p:cNvPr id="2" name="Predefined Process 1">
+            <a:extLst>
+              <a:ext uri="{FF2B5EF4-FFF2-40B4-BE49-F238E27FC236}">
+                <a16:creationId xmlns:a16="http://schemas.microsoft.com/office/drawing/2014/main" id="{890C907C-FEB7-C626-5422-F11792E69DB8}"/>
+              </a:ext>
+            </a:extLst>
+          </p:cNvPr>
+          <p:cNvSpPr/>
+          <p:nvPr/>
+        </p:nvSpPr>
+        <p:spPr>
+          <a:xfrm>
+            <a:off x="2588885" y="4474343"/>
+            <a:ext cx="1736592" cy="354625"/>
+          </a:xfrm>
+          <a:prstGeom prst="flowChartPredefinedProcess">
+            <a:avLst/>
+          </a:prstGeom>
+        </p:spPr>
+        <p:style>
+          <a:lnRef idx="2">
+            <a:schemeClr val="accent1">
+              <a:shade val="50000"/>
+            </a:schemeClr>
+          </a:lnRef>
+          <a:fillRef idx="1">
+            <a:schemeClr val="accent1"/>
+          </a:fillRef>
+          <a:effectRef idx="0">
+            <a:schemeClr val="accent1"/>
+          </a:effectRef>
+          <a:fontRef idx="minor">
+            <a:schemeClr val="lt1"/>
+          </a:fontRef>
+        </p:style>
+        <p:txBody>
+          <a:bodyPr rtlCol="0" anchor="ctr"/>
+          <a:lstStyle/>
+          <a:p>
+            <a:pPr algn="ctr"/>
+            <a:r>
+              <a:rPr lang="en-US" dirty="0">
+                <a:latin typeface="Andale Mono" panose="020B0509000000000004" pitchFamily="49" charset="0"/>
+              </a:rPr>
+              <a:t>classify</a:t>
+            </a:r>
+          </a:p>
+        </p:txBody>
+      </p:sp>
+      <p:cxnSp>
+        <p:nvCxnSpPr>
+          <p:cNvPr id="7" name="Straight Arrow Connector 6">
+            <a:extLst>
+              <a:ext uri="{FF2B5EF4-FFF2-40B4-BE49-F238E27FC236}">
+                <a16:creationId xmlns:a16="http://schemas.microsoft.com/office/drawing/2014/main" id="{26506DBE-B19F-C61C-7EAF-63CD86930457}"/>
+              </a:ext>
+            </a:extLst>
+          </p:cNvPr>
+          <p:cNvCxnSpPr>
+            <a:cxnSpLocks/>
+          </p:cNvCxnSpPr>
+          <p:nvPr/>
+        </p:nvCxnSpPr>
+        <p:spPr>
+          <a:xfrm>
+            <a:off x="3457181" y="4714668"/>
+            <a:ext cx="0" cy="333949"/>
+          </a:xfrm>
+          <a:prstGeom prst="straightConnector1">
+            <a:avLst/>
+          </a:prstGeom>
+          <a:ln w="31750">
+            <a:tailEnd type="triangle" w="lg" len="med"/>
+          </a:ln>
+        </p:spPr>
+        <p:style>
+          <a:lnRef idx="1">
+            <a:schemeClr val="accent1"/>
+          </a:lnRef>
+          <a:fillRef idx="0">
+            <a:schemeClr val="accent1"/>
+          </a:fillRef>
+          <a:effectRef idx="0">
+            <a:schemeClr val="accent1"/>
+          </a:effectRef>
+          <a:fontRef idx="minor">
+            <a:schemeClr val="tx1"/>
+          </a:fontRef>
+        </p:style>
+      </p:cxnSp>
+      <p:sp>
+        <p:nvSpPr>
+          <p:cNvPr id="9" name="Document 8">
+            <a:extLst>
+              <a:ext uri="{FF2B5EF4-FFF2-40B4-BE49-F238E27FC236}">
+                <a16:creationId xmlns:a16="http://schemas.microsoft.com/office/drawing/2014/main" id="{F864A9D8-A7E5-A536-E4B0-B10AB1908E46}"/>
+              </a:ext>
+            </a:extLst>
+          </p:cNvPr>
+          <p:cNvSpPr/>
+          <p:nvPr/>
+        </p:nvSpPr>
+        <p:spPr>
+          <a:xfrm>
+            <a:off x="2543960" y="5038107"/>
+            <a:ext cx="1620000" cy="457371"/>
+          </a:xfrm>
+          <a:prstGeom prst="flowChartDocument">
+            <a:avLst/>
+          </a:prstGeom>
+          <a:solidFill>
+            <a:schemeClr val="accent4">
+              <a:lumMod val="40000"/>
+              <a:lumOff val="60000"/>
+            </a:schemeClr>
+          </a:solidFill>
+          <a:ln>
+            <a:solidFill>
+              <a:schemeClr val="tx1">
+                <a:lumMod val="95000"/>
+                <a:lumOff val="5000"/>
+              </a:schemeClr>
+            </a:solidFill>
+          </a:ln>
+        </p:spPr>
+        <p:style>
+          <a:lnRef idx="2">
+            <a:schemeClr val="accent1">
+              <a:shade val="50000"/>
+            </a:schemeClr>
+          </a:lnRef>
+          <a:fillRef idx="1">
+            <a:schemeClr val="accent1"/>
+          </a:fillRef>
+          <a:effectRef idx="0">
+            <a:schemeClr val="accent1"/>
+          </a:effectRef>
+          <a:fontRef idx="minor">
+            <a:schemeClr val="lt1"/>
+          </a:fontRef>
+        </p:style>
+        <p:txBody>
+          <a:bodyPr rtlCol="0" anchor="t" anchorCtr="0"/>
+          <a:lstStyle/>
+          <a:p>
+            <a:pPr algn="ctr"/>
+            <a:r>
+              <a:rPr lang="en-US" dirty="0">
+                <a:solidFill>
+                  <a:schemeClr val="tx1">
+                    <a:lumMod val="95000"/>
+                    <a:lumOff val="5000"/>
+                  </a:schemeClr>
+                </a:solidFill>
+              </a:rPr>
+              <a:t>Classified ASVs</a:t>
+            </a:r>
+          </a:p>
+        </p:txBody>
+      </p:sp>
+      <p:cxnSp>
+        <p:nvCxnSpPr>
+          <p:cNvPr id="134" name="Straight Arrow Connector 133">
+            <a:extLst>
+              <a:ext uri="{FF2B5EF4-FFF2-40B4-BE49-F238E27FC236}">
+                <a16:creationId xmlns:a16="http://schemas.microsoft.com/office/drawing/2014/main" id="{610E7B62-61F4-3FA3-7F05-95AA35BADCCC}"/>
+              </a:ext>
+            </a:extLst>
+          </p:cNvPr>
+          <p:cNvCxnSpPr>
+            <a:cxnSpLocks/>
+            <a:stCxn id="35" idx="2"/>
+            <a:endCxn id="43" idx="0"/>
+          </p:cNvCxnSpPr>
+          <p:nvPr/>
+        </p:nvCxnSpPr>
+        <p:spPr>
+          <a:xfrm>
+            <a:off x="5841529" y="1261587"/>
+            <a:ext cx="0" cy="2953433"/>
+          </a:xfrm>
+          <a:prstGeom prst="straightConnector1">
+            <a:avLst/>
+          </a:prstGeom>
+          <a:ln w="31750">
+            <a:tailEnd type="triangle" w="lg" len="med"/>
+          </a:ln>
+        </p:spPr>
+        <p:style>
+          <a:lnRef idx="1">
+            <a:schemeClr val="accent1"/>
+          </a:lnRef>
+          <a:fillRef idx="0">
+            <a:schemeClr val="accent1"/>
+          </a:fillRef>
+          <a:effectRef idx="0">
+            <a:schemeClr val="accent1"/>
+          </a:effectRef>
+          <a:fontRef idx="minor">
+            <a:schemeClr val="tx1"/>
+          </a:fontRef>
+        </p:style>
+      </p:cxnSp>
+      <p:sp>
+        <p:nvSpPr>
+          <p:cNvPr id="20" name="Predefined Process 19">
+            <a:extLst>
+              <a:ext uri="{FF2B5EF4-FFF2-40B4-BE49-F238E27FC236}">
+                <a16:creationId xmlns:a16="http://schemas.microsoft.com/office/drawing/2014/main" id="{6D0D1981-42F7-1243-9B82-BD7A2E4B3DA8}"/>
+              </a:ext>
+            </a:extLst>
+          </p:cNvPr>
+          <p:cNvSpPr/>
+          <p:nvPr/>
+        </p:nvSpPr>
+        <p:spPr>
+          <a:xfrm>
+            <a:off x="2588886" y="3351247"/>
+            <a:ext cx="1736592" cy="354625"/>
+          </a:xfrm>
+          <a:prstGeom prst="flowChartPredefinedProcess">
+            <a:avLst/>
+          </a:prstGeom>
+        </p:spPr>
+        <p:style>
+          <a:lnRef idx="2">
+            <a:schemeClr val="accent1">
+              <a:shade val="50000"/>
+            </a:schemeClr>
+          </a:lnRef>
+          <a:fillRef idx="1">
+            <a:schemeClr val="accent1"/>
+          </a:fillRef>
+          <a:effectRef idx="0">
+            <a:schemeClr val="accent1"/>
+          </a:effectRef>
+          <a:fontRef idx="minor">
+            <a:schemeClr val="lt1"/>
+          </a:fontRef>
+        </p:style>
+        <p:txBody>
+          <a:bodyPr rtlCol="0" anchor="ctr"/>
+          <a:lstStyle/>
+          <a:p>
+            <a:pPr algn="ctr"/>
+            <a:r>
+              <a:rPr lang="en-US" dirty="0">
+                <a:latin typeface="Andale Mono" panose="020B0509000000000004" pitchFamily="49" charset="0"/>
+              </a:rPr>
+              <a:t>tally</a:t>
+            </a:r>
+          </a:p>
+        </p:txBody>
+      </p:sp>
+      <p:sp>
+        <p:nvSpPr>
+          <p:cNvPr id="144" name="Document 143">
+            <a:extLst>
+              <a:ext uri="{FF2B5EF4-FFF2-40B4-BE49-F238E27FC236}">
+                <a16:creationId xmlns:a16="http://schemas.microsoft.com/office/drawing/2014/main" id="{FC76858F-D46A-BBE7-49B9-784721D7BF4D}"/>
+              </a:ext>
+            </a:extLst>
+          </p:cNvPr>
+          <p:cNvSpPr/>
+          <p:nvPr/>
+        </p:nvSpPr>
+        <p:spPr>
+          <a:xfrm>
+            <a:off x="7367813" y="5008227"/>
+            <a:ext cx="1899558" cy="513105"/>
+          </a:xfrm>
+          <a:prstGeom prst="flowChartDocument">
+            <a:avLst/>
+          </a:prstGeom>
+          <a:solidFill>
+            <a:schemeClr val="accent2">
+              <a:lumMod val="40000"/>
+              <a:lumOff val="60000"/>
+            </a:schemeClr>
+          </a:solidFill>
+          <a:ln>
+            <a:solidFill>
+              <a:schemeClr val="tx1">
+                <a:lumMod val="95000"/>
+                <a:lumOff val="5000"/>
+              </a:schemeClr>
+            </a:solidFill>
+          </a:ln>
+        </p:spPr>
+        <p:style>
+          <a:lnRef idx="2">
+            <a:schemeClr val="accent1">
+              <a:shade val="50000"/>
+            </a:schemeClr>
+          </a:lnRef>
+          <a:fillRef idx="1">
+            <a:schemeClr val="accent1"/>
+          </a:fillRef>
+          <a:effectRef idx="0">
+            <a:schemeClr val="accent1"/>
+          </a:effectRef>
+          <a:fontRef idx="minor">
+            <a:schemeClr val="lt1"/>
+          </a:fontRef>
+        </p:style>
+        <p:txBody>
+          <a:bodyPr rtlCol="0" anchor="t" anchorCtr="0"/>
+          <a:lstStyle/>
+          <a:p>
+            <a:pPr algn="ctr"/>
+            <a:r>
+              <a:rPr lang="en-US" dirty="0" err="1">
+                <a:solidFill>
+                  <a:schemeClr val="tx1">
+                    <a:lumMod val="95000"/>
+                    <a:lumOff val="5000"/>
+                  </a:schemeClr>
+                </a:solidFill>
+              </a:rPr>
+              <a:t>Cytoscape</a:t>
+            </a:r>
+            <a:r>
+              <a:rPr lang="en-US" dirty="0">
+                <a:solidFill>
+                  <a:schemeClr val="tx1">
+                    <a:lumMod val="95000"/>
+                    <a:lumOff val="5000"/>
+                  </a:schemeClr>
+                </a:solidFill>
+              </a:rPr>
+              <a:t> Graph</a:t>
+            </a:r>
+          </a:p>
+        </p:txBody>
+      </p:sp>
+      <p:sp>
+        <p:nvSpPr>
+          <p:cNvPr id="145" name="Predefined Process 144">
+            <a:extLst>
+              <a:ext uri="{FF2B5EF4-FFF2-40B4-BE49-F238E27FC236}">
+                <a16:creationId xmlns:a16="http://schemas.microsoft.com/office/drawing/2014/main" id="{947D1538-DAA0-6DA1-C9BE-DE8F6F72EEFB}"/>
+              </a:ext>
+            </a:extLst>
+          </p:cNvPr>
+          <p:cNvSpPr/>
+          <p:nvPr/>
+        </p:nvSpPr>
+        <p:spPr>
+          <a:xfrm>
+            <a:off x="4765673" y="5086770"/>
+            <a:ext cx="2174882" cy="356232"/>
+          </a:xfrm>
+          <a:prstGeom prst="flowChartPredefinedProcess">
+            <a:avLst/>
+          </a:prstGeom>
+        </p:spPr>
+        <p:style>
+          <a:lnRef idx="2">
+            <a:schemeClr val="accent1">
+              <a:shade val="50000"/>
+            </a:schemeClr>
+          </a:lnRef>
+          <a:fillRef idx="1">
+            <a:schemeClr val="accent1"/>
+          </a:fillRef>
+          <a:effectRef idx="0">
+            <a:schemeClr val="accent1"/>
+          </a:effectRef>
+          <a:fontRef idx="minor">
+            <a:schemeClr val="lt1"/>
+          </a:fontRef>
+        </p:style>
+        <p:txBody>
+          <a:bodyPr rtlCol="0" anchor="ctr"/>
+          <a:lstStyle/>
+          <a:p>
+            <a:pPr algn="ctr"/>
+            <a:r>
+              <a:rPr lang="en-US" dirty="0">
+                <a:latin typeface="Andale Mono" panose="020B0509000000000004" pitchFamily="49" charset="0"/>
+              </a:rPr>
+              <a:t>edit-graph</a:t>
+            </a:r>
+          </a:p>
+        </p:txBody>
+      </p:sp>
+      <p:cxnSp>
+        <p:nvCxnSpPr>
+          <p:cNvPr id="146" name="Straight Arrow Connector 145">
+            <a:extLst>
+              <a:ext uri="{FF2B5EF4-FFF2-40B4-BE49-F238E27FC236}">
+                <a16:creationId xmlns:a16="http://schemas.microsoft.com/office/drawing/2014/main" id="{3FC6D9E4-8FDA-7E43-B7FD-9BF2405AB927}"/>
+              </a:ext>
+            </a:extLst>
+          </p:cNvPr>
+          <p:cNvCxnSpPr>
+            <a:cxnSpLocks/>
+            <a:stCxn id="145" idx="3"/>
+            <a:endCxn id="144" idx="1"/>
+          </p:cNvCxnSpPr>
+          <p:nvPr/>
+        </p:nvCxnSpPr>
+        <p:spPr>
+          <a:xfrm flipV="1">
+            <a:off x="6940555" y="5264780"/>
+            <a:ext cx="427258" cy="106"/>
+          </a:xfrm>
+          <a:prstGeom prst="straightConnector1">
+            <a:avLst/>
+          </a:prstGeom>
+          <a:ln w="31750">
+            <a:tailEnd type="triangle" w="lg" len="med"/>
+          </a:ln>
+        </p:spPr>
+        <p:style>
+          <a:lnRef idx="1">
+            <a:schemeClr val="accent1"/>
+          </a:lnRef>
+          <a:fillRef idx="0">
+            <a:schemeClr val="accent1"/>
+          </a:fillRef>
+          <a:effectRef idx="0">
+            <a:schemeClr val="accent1"/>
+          </a:effectRef>
+          <a:fontRef idx="minor">
+            <a:schemeClr val="tx1"/>
+          </a:fontRef>
+        </p:style>
+      </p:cxnSp>
+      <p:cxnSp>
+        <p:nvCxnSpPr>
+          <p:cNvPr id="162" name="Elbow Connector 161">
+            <a:extLst>
+              <a:ext uri="{FF2B5EF4-FFF2-40B4-BE49-F238E27FC236}">
+                <a16:creationId xmlns:a16="http://schemas.microsoft.com/office/drawing/2014/main" id="{147FB21B-B885-28FB-AEB6-2B31B3E0C752}"/>
+              </a:ext>
+            </a:extLst>
+          </p:cNvPr>
+          <p:cNvCxnSpPr>
+            <a:cxnSpLocks/>
+            <a:stCxn id="9" idx="3"/>
+            <a:endCxn id="43" idx="1"/>
+          </p:cNvCxnSpPr>
+          <p:nvPr/>
+        </p:nvCxnSpPr>
+        <p:spPr>
+          <a:xfrm flipV="1">
+            <a:off x="4163960" y="4393136"/>
+            <a:ext cx="590128" cy="873657"/>
+          </a:xfrm>
+          <a:prstGeom prst="bentConnector3">
+            <a:avLst>
+              <a:gd name="adj1" fmla="val 69369"/>
+            </a:avLst>
+          </a:prstGeom>
+          <a:ln w="31750">
+            <a:tailEnd type="triangle" w="lg" len="med"/>
+          </a:ln>
+        </p:spPr>
+        <p:style>
+          <a:lnRef idx="1">
+            <a:schemeClr val="accent1"/>
+          </a:lnRef>
+          <a:fillRef idx="0">
+            <a:schemeClr val="accent1"/>
+          </a:fillRef>
+          <a:effectRef idx="0">
+            <a:schemeClr val="accent1"/>
+          </a:effectRef>
+          <a:fontRef idx="minor">
+            <a:schemeClr val="tx1"/>
+          </a:fontRef>
+        </p:style>
+      </p:cxnSp>
     </p:spTree>
     <p:extLst>
       <p:ext uri="{BB962C8B-B14F-4D97-AF65-F5344CB8AC3E}">

</xml_diff>